<commit_message>
final ICIS 2018 poster
</commit_message>
<xml_diff>
--- a/write-ups/ICIS 2018/Misp_MA_portrait.pptx
+++ b/write-ups/ICIS 2018/Misp_MA_portrait.pptx
@@ -142,7 +142,7 @@
   </p:defaultTextStyle>
   <p:extLst>
     <p:ext uri="{EFAFB233-063F-42B5-8137-9DF3F51BA10A}">
-      <p15:sldGuideLst xmlns:p15="http://schemas.microsoft.com/office/powerpoint/2012/main" xmlns="">
+      <p15:sldGuideLst xmlns="" xmlns:p15="http://schemas.microsoft.com/office/powerpoint/2012/main">
         <p15:guide id="1" orient="horz" pos="5141">
           <p15:clr>
             <a:srgbClr val="A4A3A4"/>
@@ -156,7 +156,7 @@
       </p15:sldGuideLst>
     </p:ext>
     <p:ext uri="{2D200454-40CA-4A62-9FC3-DE9A4176ACB9}">
-      <p15:notesGuideLst xmlns:p15="http://schemas.microsoft.com/office/powerpoint/2012/main" xmlns="">
+      <p15:notesGuideLst xmlns="" xmlns:p15="http://schemas.microsoft.com/office/powerpoint/2012/main">
         <p15:guide id="1" orient="horz" pos="13122">
           <p15:clr>
             <a:srgbClr val="A4A3A4"/>
@@ -4281,7 +4281,7 @@
         </p:nvSpPr>
         <p:spPr>
           <a:xfrm>
-            <a:off x="447975" y="7792369"/>
+            <a:off x="447975" y="6784257"/>
             <a:ext cx="12961439" cy="9289032"/>
           </a:xfrm>
           <a:prstGeom prst="roundRect">
@@ -4347,17 +4347,7 @@
                 <a:latin typeface="Times"/>
                 <a:cs typeface="Times"/>
               </a:rPr>
-              <a:t>Mispronunciation </a:t>
-            </a:r>
-            <a:r>
-              <a:rPr lang="en-US" sz="4800" u="sng" dirty="0" smtClean="0">
-                <a:solidFill>
-                  <a:schemeClr val="tx1"/>
-                </a:solidFill>
-                <a:latin typeface="Times"/>
-                <a:cs typeface="Times"/>
-              </a:rPr>
-              <a:t>Sensitivity</a:t>
+              <a:t>Mispronunciation Sensitivity</a:t>
             </a:r>
           </a:p>
           <a:p>
@@ -4502,8 +4492,8 @@
         </p:nvSpPr>
         <p:spPr bwMode="auto">
           <a:xfrm>
-            <a:off x="0" y="5"/>
-            <a:ext cx="30275213" cy="7504331"/>
+            <a:off x="0" y="6"/>
+            <a:ext cx="30275213" cy="6496220"/>
           </a:xfrm>
           <a:prstGeom prst="rect">
             <a:avLst/>
@@ -4564,42 +4554,21 @@
                 <a:latin typeface="Times"/>
                 <a:cs typeface="Times"/>
               </a:rPr>
-              <a:t>Katie Von </a:t>
+              <a:t>Katie Von Holzen</a:t>
+            </a:r>
+            <a:r>
+              <a:rPr lang="de-DE" sz="6400" i="1" baseline="30000" dirty="0" smtClean="0">
+                <a:latin typeface="Times"/>
+                <a:cs typeface="Times"/>
+              </a:rPr>
+              <a:t>1,2</a:t>
             </a:r>
             <a:r>
               <a:rPr lang="de-DE" sz="6400" i="1" dirty="0" smtClean="0">
                 <a:latin typeface="Times"/>
                 <a:cs typeface="Times"/>
               </a:rPr>
-              <a:t>Holzen</a:t>
-            </a:r>
-            <a:r>
-              <a:rPr lang="de-DE" sz="6400" i="1" baseline="30000" dirty="0" smtClean="0">
-                <a:latin typeface="Times"/>
-                <a:cs typeface="Times"/>
-              </a:rPr>
-              <a:t>1,2</a:t>
-            </a:r>
-            <a:r>
-              <a:rPr lang="de-DE" sz="6400" i="1" dirty="0" smtClean="0">
-                <a:latin typeface="Times"/>
-                <a:cs typeface="Times"/>
-              </a:rPr>
-              <a:t> </a:t>
-            </a:r>
-            <a:r>
-              <a:rPr lang="de-DE" sz="6400" i="1" dirty="0" smtClean="0">
-                <a:latin typeface="Times"/>
-                <a:cs typeface="Times"/>
-              </a:rPr>
-              <a:t>&amp; Christina </a:t>
-            </a:r>
-            <a:r>
-              <a:rPr lang="de-DE" sz="6400" i="1" dirty="0" smtClean="0">
-                <a:latin typeface="Times"/>
-                <a:cs typeface="Times"/>
-              </a:rPr>
-              <a:t>Bergmann</a:t>
+              <a:t> &amp; Christina Bergmann</a:t>
             </a:r>
             <a:r>
               <a:rPr lang="de-DE" sz="6400" i="1" baseline="30000" dirty="0" smtClean="0">
@@ -4660,7 +4629,7 @@
         </p:nvSpPr>
         <p:spPr>
           <a:xfrm>
-            <a:off x="-7789" y="2561029"/>
+            <a:off x="-7789" y="3171933"/>
             <a:ext cx="30275213" cy="3324292"/>
           </a:xfrm>
           <a:prstGeom prst="rect">
@@ -4674,14 +4643,13 @@
           </a:bodyPr>
           <a:lstStyle/>
           <a:p>
-            <a:pPr marL="914400" indent="-914400" algn="ctr" defTabSz="608849">
-              <a:buAutoNum type="arabicPeriod"/>
-            </a:pPr>
+            <a:pPr algn="ctr" defTabSz="608849"/>
             <a:r>
               <a:rPr lang="en-GB" sz="4800" dirty="0" smtClean="0">
-                <a:latin typeface="+mn-lt"/>
-              </a:rPr>
-              <a:t>University of Maryland, USA</a:t>
+                <a:latin typeface="Times"/>
+                <a:cs typeface="Times"/>
+              </a:rPr>
+              <a:t>1. University of Maryland, USA</a:t>
             </a:r>
           </a:p>
           <a:p>
@@ -4803,7 +4771,7 @@
         </p:blipFill>
         <p:spPr>
           <a:xfrm>
-            <a:off x="615994" y="10285151"/>
+            <a:off x="615994" y="9277039"/>
             <a:ext cx="2736304" cy="2052228"/>
           </a:xfrm>
           <a:prstGeom prst="rect">
@@ -4838,7 +4806,7 @@
         </p:blipFill>
         <p:spPr>
           <a:xfrm>
-            <a:off x="3544318" y="10285151"/>
+            <a:off x="3544318" y="9277039"/>
             <a:ext cx="2736304" cy="2052228"/>
           </a:xfrm>
           <a:prstGeom prst="rect">
@@ -4859,8 +4827,8 @@
         </p:nvSpPr>
         <p:spPr>
           <a:xfrm>
-            <a:off x="447975" y="17441441"/>
-            <a:ext cx="12961439" cy="4392488"/>
+            <a:off x="447975" y="16649353"/>
+            <a:ext cx="12961439" cy="19730192"/>
           </a:xfrm>
           <a:prstGeom prst="roundRect">
             <a:avLst/>
@@ -4905,17 +4873,7 @@
                 <a:latin typeface="Times"/>
                 <a:cs typeface="Times"/>
               </a:rPr>
-              <a:t>How </a:t>
-            </a:r>
-            <a:r>
-              <a:rPr lang="en-US" sz="4800" u="sng" dirty="0">
-                <a:solidFill>
-                  <a:schemeClr val="tx1"/>
-                </a:solidFill>
-                <a:latin typeface="Times"/>
-                <a:cs typeface="Times"/>
-              </a:rPr>
-              <a:t>does mispronunciation sensitivity change as infants develop?</a:t>
+              <a:t>How does mispronunciation sensitivity change as infants develop?</a:t>
             </a:r>
           </a:p>
           <a:p>
@@ -5006,18 +4964,29 @@
                 <a:latin typeface="Times"/>
                 <a:cs typeface="Times"/>
               </a:rPr>
-              <a:t>No change in sensitivity with </a:t>
-            </a:r>
-            <a:r>
-              <a:rPr lang="en-US" sz="4800" b="0" dirty="0" smtClean="0">
-                <a:solidFill>
-                  <a:schemeClr val="tx1"/>
-                </a:solidFill>
-                <a:latin typeface="Times"/>
-                <a:cs typeface="Times"/>
-              </a:rPr>
-              <a:t>development</a:t>
-            </a:r>
+              <a:t>No change in sensitivity with development</a:t>
+            </a:r>
+          </a:p>
+          <a:p>
+            <a:pPr lvl="0">
+              <a:spcAft>
+                <a:spcPts val="1200"/>
+              </a:spcAft>
+            </a:pPr>
+            <a:endParaRPr lang="en-US" sz="4800" b="0" dirty="0" smtClean="0">
+              <a:solidFill>
+                <a:schemeClr val="tx1"/>
+              </a:solidFill>
+              <a:latin typeface="Times"/>
+              <a:cs typeface="Times"/>
+            </a:endParaRPr>
+          </a:p>
+          <a:p>
+            <a:pPr lvl="0">
+              <a:spcAft>
+                <a:spcPts val="1200"/>
+              </a:spcAft>
+            </a:pPr>
             <a:endParaRPr lang="en-US" sz="4800" b="0" dirty="0">
               <a:solidFill>
                 <a:schemeClr val="tx1"/>
@@ -5026,6 +4995,321 @@
               <a:cs typeface="Times"/>
             </a:endParaRPr>
           </a:p>
+          <a:p>
+            <a:pPr lvl="0">
+              <a:spcAft>
+                <a:spcPts val="1200"/>
+              </a:spcAft>
+            </a:pPr>
+            <a:endParaRPr lang="en-US" sz="4800" b="0" dirty="0">
+              <a:solidFill>
+                <a:schemeClr val="tx1"/>
+              </a:solidFill>
+              <a:latin typeface="Times"/>
+              <a:cs typeface="Times"/>
+            </a:endParaRPr>
+          </a:p>
+          <a:p>
+            <a:pPr lvl="0">
+              <a:spcAft>
+                <a:spcPts val="1200"/>
+              </a:spcAft>
+            </a:pPr>
+            <a:endParaRPr lang="en-US" sz="4800" b="0" dirty="0">
+              <a:solidFill>
+                <a:schemeClr val="tx1"/>
+              </a:solidFill>
+              <a:latin typeface="Times"/>
+              <a:cs typeface="Times"/>
+            </a:endParaRPr>
+          </a:p>
+          <a:p>
+            <a:pPr lvl="0">
+              <a:spcAft>
+                <a:spcPts val="1200"/>
+              </a:spcAft>
+            </a:pPr>
+            <a:endParaRPr lang="en-US" sz="4800" b="0" dirty="0">
+              <a:solidFill>
+                <a:schemeClr val="tx1"/>
+              </a:solidFill>
+              <a:latin typeface="Times"/>
+              <a:cs typeface="Times"/>
+            </a:endParaRPr>
+          </a:p>
+          <a:p>
+            <a:pPr lvl="0">
+              <a:spcAft>
+                <a:spcPts val="1200"/>
+              </a:spcAft>
+            </a:pPr>
+            <a:endParaRPr lang="en-US" sz="4800" b="0" dirty="0">
+              <a:solidFill>
+                <a:schemeClr val="tx1"/>
+              </a:solidFill>
+              <a:latin typeface="Times"/>
+              <a:cs typeface="Times"/>
+            </a:endParaRPr>
+          </a:p>
+          <a:p>
+            <a:pPr lvl="0">
+              <a:spcAft>
+                <a:spcPts val="1200"/>
+              </a:spcAft>
+            </a:pPr>
+            <a:endParaRPr lang="en-US" sz="4800" b="0" dirty="0">
+              <a:solidFill>
+                <a:schemeClr val="tx1"/>
+              </a:solidFill>
+              <a:latin typeface="Times"/>
+              <a:cs typeface="Times"/>
+            </a:endParaRPr>
+          </a:p>
+          <a:p>
+            <a:pPr lvl="0">
+              <a:spcAft>
+                <a:spcPts val="1200"/>
+              </a:spcAft>
+            </a:pPr>
+            <a:endParaRPr lang="en-US" sz="4800" b="0" dirty="0">
+              <a:solidFill>
+                <a:schemeClr val="tx1"/>
+              </a:solidFill>
+              <a:latin typeface="Times"/>
+              <a:cs typeface="Times"/>
+            </a:endParaRPr>
+          </a:p>
+          <a:p>
+            <a:pPr lvl="0">
+              <a:spcAft>
+                <a:spcPts val="1200"/>
+              </a:spcAft>
+            </a:pPr>
+            <a:endParaRPr lang="en-US" sz="4800" b="0" dirty="0">
+              <a:solidFill>
+                <a:schemeClr val="tx1"/>
+              </a:solidFill>
+              <a:latin typeface="Times"/>
+              <a:cs typeface="Times"/>
+            </a:endParaRPr>
+          </a:p>
+          <a:p>
+            <a:pPr algn="ctr"/>
+            <a:r>
+              <a:rPr lang="en-US" sz="4800" u="sng" dirty="0">
+                <a:solidFill>
+                  <a:schemeClr val="tx1"/>
+                </a:solidFill>
+                <a:latin typeface="Times"/>
+                <a:cs typeface="Times"/>
+              </a:rPr>
+              <a:t>Correct </a:t>
+            </a:r>
+          </a:p>
+          <a:p>
+            <a:r>
+              <a:rPr lang="en-US" sz="4800" b="0" dirty="0">
+                <a:solidFill>
+                  <a:schemeClr val="tx1"/>
+                </a:solidFill>
+                <a:latin typeface="Times"/>
+                <a:cs typeface="Times"/>
+              </a:rPr>
+              <a:t>Recognition: </a:t>
+            </a:r>
+            <a:r>
+              <a:rPr lang="en-US" sz="4800" b="0" i="1" dirty="0">
+                <a:solidFill>
+                  <a:schemeClr val="tx1"/>
+                </a:solidFill>
+                <a:latin typeface="Times"/>
+                <a:cs typeface="Times"/>
+              </a:rPr>
+              <a:t>g</a:t>
+            </a:r>
+            <a:r>
+              <a:rPr lang="en-US" sz="4800" b="0" dirty="0">
+                <a:solidFill>
+                  <a:schemeClr val="tx1"/>
+                </a:solidFill>
+                <a:latin typeface="Times"/>
+                <a:cs typeface="Times"/>
+              </a:rPr>
+              <a:t> = 0.91, SE = 0.12, </a:t>
+            </a:r>
+            <a:r>
+              <a:rPr lang="en-US" sz="4800" b="0" i="1" dirty="0">
+                <a:solidFill>
+                  <a:schemeClr val="tx1"/>
+                </a:solidFill>
+                <a:latin typeface="Times"/>
+                <a:cs typeface="Times"/>
+              </a:rPr>
+              <a:t>p</a:t>
+            </a:r>
+            <a:r>
+              <a:rPr lang="en-US" sz="4800" b="0" dirty="0">
+                <a:solidFill>
+                  <a:schemeClr val="tx1"/>
+                </a:solidFill>
+                <a:latin typeface="Times"/>
+                <a:cs typeface="Times"/>
+              </a:rPr>
+              <a:t> &lt; .0001 </a:t>
+            </a:r>
+          </a:p>
+          <a:p>
+            <a:pPr algn="ctr"/>
+            <a:r>
+              <a:rPr lang="en-US" sz="4800" u="sng" dirty="0">
+                <a:solidFill>
+                  <a:schemeClr val="tx1"/>
+                </a:solidFill>
+                <a:latin typeface="Times"/>
+                <a:cs typeface="Times"/>
+              </a:rPr>
+              <a:t>Mispronunciation</a:t>
+            </a:r>
+          </a:p>
+          <a:p>
+            <a:r>
+              <a:rPr lang="en-US" sz="4800" b="0" dirty="0">
+                <a:solidFill>
+                  <a:schemeClr val="tx1"/>
+                </a:solidFill>
+                <a:latin typeface="Times"/>
+                <a:cs typeface="Times"/>
+              </a:rPr>
+              <a:t>Recognition: </a:t>
+            </a:r>
+            <a:r>
+              <a:rPr lang="en-US" sz="4800" b="0" i="1" dirty="0">
+                <a:solidFill>
+                  <a:schemeClr val="tx1"/>
+                </a:solidFill>
+                <a:latin typeface="Times"/>
+                <a:cs typeface="Times"/>
+              </a:rPr>
+              <a:t>g</a:t>
+            </a:r>
+            <a:r>
+              <a:rPr lang="en-US" sz="4800" b="0" dirty="0">
+                <a:solidFill>
+                  <a:schemeClr val="tx1"/>
+                </a:solidFill>
+                <a:latin typeface="Times"/>
+                <a:cs typeface="Times"/>
+              </a:rPr>
+              <a:t> = 0.25, SE = 0.06, p &lt; .0001</a:t>
+            </a:r>
+          </a:p>
+          <a:p>
+            <a:pPr algn="ctr"/>
+            <a:r>
+              <a:rPr lang="en-US" sz="4800" u="sng" dirty="0">
+                <a:solidFill>
+                  <a:schemeClr val="tx1"/>
+                </a:solidFill>
+                <a:latin typeface="Times"/>
+                <a:cs typeface="Times"/>
+              </a:rPr>
+              <a:t>Correct vs. Mispronunciation</a:t>
+            </a:r>
+          </a:p>
+          <a:p>
+            <a:r>
+              <a:rPr lang="en-US" sz="4800" b="0" dirty="0">
+                <a:solidFill>
+                  <a:schemeClr val="tx1"/>
+                </a:solidFill>
+                <a:latin typeface="Times"/>
+                <a:cs typeface="Times"/>
+              </a:rPr>
+              <a:t>Sensitivity: </a:t>
+            </a:r>
+            <a:r>
+              <a:rPr lang="en-US" sz="4800" b="0" i="1" dirty="0">
+                <a:solidFill>
+                  <a:schemeClr val="tx1"/>
+                </a:solidFill>
+                <a:latin typeface="Times"/>
+                <a:cs typeface="Times"/>
+              </a:rPr>
+              <a:t>g</a:t>
+            </a:r>
+            <a:r>
+              <a:rPr lang="en-US" sz="4800" b="0" dirty="0">
+                <a:solidFill>
+                  <a:schemeClr val="tx1"/>
+                </a:solidFill>
+                <a:latin typeface="Times"/>
+                <a:cs typeface="Times"/>
+              </a:rPr>
+              <a:t> = .5, SE = .03, </a:t>
+            </a:r>
+            <a:r>
+              <a:rPr lang="en-US" sz="4800" b="0" i="1" dirty="0">
+                <a:solidFill>
+                  <a:schemeClr val="tx1"/>
+                </a:solidFill>
+                <a:latin typeface="Times"/>
+                <a:cs typeface="Times"/>
+              </a:rPr>
+              <a:t>p</a:t>
+            </a:r>
+            <a:r>
+              <a:rPr lang="en-US" sz="4800" b="0" dirty="0">
+                <a:solidFill>
+                  <a:schemeClr val="tx1"/>
+                </a:solidFill>
+                <a:latin typeface="Times"/>
+                <a:cs typeface="Times"/>
+              </a:rPr>
+              <a:t> &lt; .0001</a:t>
+            </a:r>
+          </a:p>
+          <a:p>
+            <a:pPr algn="ctr"/>
+            <a:r>
+              <a:rPr lang="en-US" sz="4800" u="sng" dirty="0">
+                <a:solidFill>
+                  <a:schemeClr val="tx1"/>
+                </a:solidFill>
+                <a:latin typeface="Times"/>
+                <a:cs typeface="Times"/>
+              </a:rPr>
+              <a:t>Interactions with Age</a:t>
+            </a:r>
+          </a:p>
+          <a:p>
+            <a:r>
+              <a:rPr lang="en-US" sz="4800" b="0" dirty="0">
+                <a:solidFill>
+                  <a:schemeClr val="tx1"/>
+                </a:solidFill>
+                <a:latin typeface="Times"/>
+                <a:cs typeface="Times"/>
+              </a:rPr>
+              <a:t>No significant interactions with </a:t>
+            </a:r>
+            <a:r>
+              <a:rPr lang="en-US" sz="4800" b="0" dirty="0" smtClean="0">
+                <a:solidFill>
+                  <a:schemeClr val="tx1"/>
+                </a:solidFill>
+                <a:latin typeface="Times"/>
+                <a:cs typeface="Times"/>
+              </a:rPr>
+              <a:t>Age</a:t>
+            </a:r>
+            <a:endParaRPr lang="en-US" sz="4800" b="0" dirty="0">
+              <a:solidFill>
+                <a:schemeClr val="tx1"/>
+              </a:solidFill>
+              <a:latin typeface="Times"/>
+              <a:cs typeface="Times"/>
+            </a:endParaRPr>
+          </a:p>
         </p:txBody>
       </p:sp>
       <p:sp>
@@ -5036,7 +5320,7 @@
         </p:nvSpPr>
         <p:spPr>
           <a:xfrm>
-            <a:off x="2752230" y="14605629"/>
+            <a:off x="2752230" y="13597517"/>
             <a:ext cx="3024336" cy="1152128"/>
           </a:xfrm>
           <a:prstGeom prst="wedgeEllipseCallout">
@@ -5084,7 +5368,7 @@
         </p:nvSpPr>
         <p:spPr>
           <a:xfrm>
-            <a:off x="808014" y="13381493"/>
+            <a:off x="808014" y="12373381"/>
             <a:ext cx="2736304" cy="1152128"/>
           </a:xfrm>
           <a:prstGeom prst="wedgeEllipseCallout">
@@ -5133,13 +5417,13 @@
           <p:nvPr>
             <p:extLst>
               <p:ext uri="{D42A27DB-BD31-4B8C-83A1-F6EECF244321}">
-                <p14:modId xmlns:p14="http://schemas.microsoft.com/office/powerpoint/2010/main" val="1538627485"/>
+                <p14:modId xmlns:p14="http://schemas.microsoft.com/office/powerpoint/2010/main" val="3057733611"/>
               </p:ext>
             </p:extLst>
           </p:nvPr>
         </p:nvGraphicFramePr>
         <p:xfrm>
-          <a:off x="13769454" y="12040841"/>
+          <a:off x="13769454" y="11176745"/>
           <a:ext cx="16201801" cy="3614596"/>
         </p:xfrm>
         <a:graphic>
@@ -6021,56 +6305,8 @@
         </p:blipFill>
         <p:spPr>
           <a:xfrm>
-            <a:off x="6424638" y="5848153"/>
-            <a:ext cx="6336704" cy="1508739"/>
-          </a:xfrm>
-          <a:prstGeom prst="rect">
-            <a:avLst/>
-          </a:prstGeom>
-        </p:spPr>
-      </p:pic>
-      <p:pic>
-        <p:nvPicPr>
-          <p:cNvPr id="18" name="Picture 17"/>
-          <p:cNvPicPr>
-            <a:picLocks noChangeAspect="1"/>
-          </p:cNvPicPr>
-          <p:nvPr/>
-        </p:nvPicPr>
-        <p:blipFill>
-          <a:blip r:embed="rId6"/>
-          <a:stretch>
-            <a:fillRect/>
-          </a:stretch>
-        </p:blipFill>
-        <p:spPr>
-          <a:xfrm>
-            <a:off x="19818126" y="5704137"/>
-            <a:ext cx="1656184" cy="1656184"/>
-          </a:xfrm>
-          <a:prstGeom prst="rect">
-            <a:avLst/>
-          </a:prstGeom>
-        </p:spPr>
-      </p:pic>
-      <p:pic>
-        <p:nvPicPr>
-          <p:cNvPr id="19" name="Picture 18"/>
-          <p:cNvPicPr>
-            <a:picLocks noChangeAspect="1"/>
-          </p:cNvPicPr>
-          <p:nvPr/>
-        </p:nvPicPr>
-        <p:blipFill>
-          <a:blip r:embed="rId7"/>
-          <a:stretch>
-            <a:fillRect/>
-          </a:stretch>
-        </p:blipFill>
-        <p:spPr>
-          <a:xfrm>
-            <a:off x="14489534" y="5704137"/>
-            <a:ext cx="4064000" cy="1663700"/>
+            <a:off x="243055" y="2840177"/>
+            <a:ext cx="5375093" cy="1279784"/>
           </a:xfrm>
           <a:prstGeom prst="rect">
             <a:avLst/>
@@ -6086,14 +6322,14 @@
           <p:nvPr/>
         </p:nvPicPr>
         <p:blipFill>
-          <a:blip r:embed="rId8"/>
+          <a:blip r:embed="rId6"/>
           <a:stretch>
             <a:fillRect/>
           </a:stretch>
         </p:blipFill>
         <p:spPr>
           <a:xfrm>
-            <a:off x="27883022" y="5200081"/>
+            <a:off x="23778566" y="1887713"/>
             <a:ext cx="1800200" cy="2006030"/>
           </a:xfrm>
           <a:prstGeom prst="rect">
@@ -6101,30 +6337,6 @@
           </a:prstGeom>
         </p:spPr>
       </p:pic>
-      <p:pic>
-        <p:nvPicPr>
-          <p:cNvPr id="21" name="Picture 20"/>
-          <p:cNvPicPr>
-            <a:picLocks noChangeAspect="1"/>
-          </p:cNvPicPr>
-          <p:nvPr/>
-        </p:nvPicPr>
-        <p:blipFill>
-          <a:blip r:embed="rId9"/>
-          <a:stretch>
-            <a:fillRect/>
-          </a:stretch>
-        </p:blipFill>
-        <p:spPr>
-          <a:xfrm>
-            <a:off x="23274510" y="5632129"/>
-            <a:ext cx="2978572" cy="1728465"/>
-          </a:xfrm>
-          <a:prstGeom prst="rect">
-            <a:avLst/>
-          </a:prstGeom>
-        </p:spPr>
-      </p:pic>
       <p:sp>
         <p:nvSpPr>
           <p:cNvPr id="22" name="Rounded Rectangle 21"/>
@@ -6133,8 +6345,8 @@
         </p:nvSpPr>
         <p:spPr>
           <a:xfrm>
-            <a:off x="21114270" y="38395769"/>
-            <a:ext cx="8856983" cy="2592288"/>
+            <a:off x="447974" y="38323761"/>
+            <a:ext cx="11305256" cy="2736304"/>
           </a:xfrm>
           <a:prstGeom prst="roundRect">
             <a:avLst/>
@@ -6173,7 +6385,7 @@
           <a:p>
             <a:pPr algn="ctr"/>
             <a:r>
-              <a:rPr lang="en-US" sz="3600" u="sng" dirty="0" smtClean="0">
+              <a:rPr lang="en-US" sz="4400" u="sng" dirty="0" smtClean="0">
                 <a:solidFill>
                   <a:schemeClr val="tx1"/>
                 </a:solidFill>
@@ -6184,12 +6396,9 @@
             </a:r>
           </a:p>
           <a:p>
-            <a:pPr marL="857250" indent="-857250">
-              <a:buFont typeface="Lucida Grande"/>
-              <a:buChar char="-"/>
-            </a:pPr>
-            <a:r>
-              <a:rPr lang="en-US" sz="3600" b="0" dirty="0" smtClean="0">
+            <a:pPr algn="ctr"/>
+            <a:r>
+              <a:rPr lang="en-US" sz="4400" b="0" dirty="0" smtClean="0">
                 <a:solidFill>
                   <a:schemeClr val="tx1"/>
                 </a:solidFill>
@@ -6200,86 +6409,20 @@
             </a:r>
           </a:p>
           <a:p>
-            <a:pPr marL="857250" indent="-857250" algn="just">
-              <a:buFont typeface="Lucida Grande"/>
-              <a:buChar char="-"/>
-            </a:pPr>
-            <a:r>
-              <a:rPr lang="en-US" sz="3600" b="0" dirty="0">
+            <a:pPr algn="ctr"/>
+            <a:r>
+              <a:rPr lang="en-US" sz="4400" b="0" dirty="0" smtClean="0">
                 <a:solidFill>
                   <a:schemeClr val="tx1"/>
                 </a:solidFill>
                 <a:latin typeface="Times"/>
                 <a:cs typeface="Times"/>
               </a:rPr>
-              <a:t>A</a:t>
-            </a:r>
-            <a:r>
-              <a:rPr lang="en-US" sz="3600" b="0" dirty="0" smtClean="0">
-                <a:solidFill>
-                  <a:schemeClr val="tx1"/>
-                </a:solidFill>
-                <a:latin typeface="Times"/>
-                <a:cs typeface="Times"/>
-              </a:rPr>
-              <a:t>dd </a:t>
-            </a:r>
-            <a:r>
-              <a:rPr lang="en-US" sz="3600" b="0" dirty="0" smtClean="0">
-                <a:solidFill>
-                  <a:schemeClr val="tx1"/>
-                </a:solidFill>
-                <a:latin typeface="Times"/>
-                <a:cs typeface="Times"/>
-              </a:rPr>
-              <a:t>it to </a:t>
-            </a:r>
-            <a:r>
-              <a:rPr lang="en-US" sz="3600" b="0" dirty="0" smtClean="0">
-                <a:solidFill>
-                  <a:schemeClr val="tx1"/>
-                </a:solidFill>
-                <a:latin typeface="Times"/>
-                <a:cs typeface="Times"/>
-              </a:rPr>
-              <a:t>our meta</a:t>
-            </a:r>
-            <a:r>
-              <a:rPr lang="en-US" sz="3600" b="0" dirty="0" smtClean="0">
-                <a:solidFill>
-                  <a:schemeClr val="tx1"/>
-                </a:solidFill>
-                <a:latin typeface="Times"/>
-                <a:cs typeface="Times"/>
-              </a:rPr>
-              <a:t>-analysis!</a:t>
-            </a:r>
-          </a:p>
-        </p:txBody>
-      </p:sp>
-      <p:pic>
-        <p:nvPicPr>
-          <p:cNvPr id="7" name="Picture 6"/>
-          <p:cNvPicPr>
-            <a:picLocks noChangeAspect="1"/>
-          </p:cNvPicPr>
-          <p:nvPr/>
-        </p:nvPicPr>
-        <p:blipFill rotWithShape="1">
-          <a:blip r:embed="rId10"/>
-          <a:srcRect l="19688" t="15385" r="68500" b="80415"/>
-          <a:stretch/>
-        </p:blipFill>
-        <p:spPr>
-          <a:xfrm>
-            <a:off x="13769454" y="38827817"/>
-            <a:ext cx="7056784" cy="1411357"/>
-          </a:xfrm>
-          <a:prstGeom prst="rect">
-            <a:avLst/>
-          </a:prstGeom>
-        </p:spPr>
-      </p:pic>
+              <a:t>Contact us and add it to our meta-analysis!</a:t>
+            </a:r>
+          </a:p>
+        </p:txBody>
+      </p:sp>
       <p:pic>
         <p:nvPicPr>
           <p:cNvPr id="5" name="Picture 4"/>
@@ -6289,7 +6432,7 @@
           <p:nvPr/>
         </p:nvPicPr>
         <p:blipFill>
-          <a:blip r:embed="rId11">
+          <a:blip r:embed="rId7">
             <a:extLst>
               <a:ext uri="{28A0092B-C50C-407E-A947-70E740481C1C}">
                 <a14:useLocalDpi xmlns:a14="http://schemas.microsoft.com/office/drawing/2010/main" val="0"/>
@@ -6302,7 +6445,7 @@
         </p:blipFill>
         <p:spPr>
           <a:xfrm>
-            <a:off x="18665998" y="38755809"/>
+            <a:off x="9392892" y="36667577"/>
             <a:ext cx="1584176" cy="1584176"/>
           </a:xfrm>
           <a:prstGeom prst="rect">
@@ -6312,298 +6455,13 @@
       </p:pic>
       <p:sp>
         <p:nvSpPr>
-          <p:cNvPr id="26" name="Rounded Rectangle 25"/>
-          <p:cNvSpPr/>
-          <p:nvPr/>
-        </p:nvSpPr>
-        <p:spPr>
-          <a:xfrm>
-            <a:off x="447974" y="32347097"/>
-            <a:ext cx="12961440" cy="8568952"/>
-          </a:xfrm>
-          <a:prstGeom prst="roundRect">
-            <a:avLst/>
-          </a:prstGeom>
-          <a:solidFill>
-            <a:schemeClr val="bg1">
-              <a:lumMod val="85000"/>
-            </a:schemeClr>
-          </a:solidFill>
-          <a:ln>
-            <a:solidFill>
-              <a:schemeClr val="tx1"/>
-            </a:solidFill>
-          </a:ln>
-        </p:spPr>
-        <p:style>
-          <a:lnRef idx="2">
-            <a:schemeClr val="accent1">
-              <a:shade val="50000"/>
-            </a:schemeClr>
-          </a:lnRef>
-          <a:fillRef idx="1">
-            <a:schemeClr val="accent1"/>
-          </a:fillRef>
-          <a:effectRef idx="0">
-            <a:schemeClr val="accent1"/>
-          </a:effectRef>
-          <a:fontRef idx="minor">
-            <a:schemeClr val="lt1"/>
-          </a:fontRef>
-        </p:style>
-        <p:txBody>
-          <a:bodyPr rtlCol="0" anchor="ctr"/>
-          <a:lstStyle/>
-          <a:p>
-            <a:pPr algn="ctr"/>
-            <a:r>
-              <a:rPr lang="en-US" sz="4800" u="sng" dirty="0" smtClean="0">
-                <a:solidFill>
-                  <a:schemeClr val="tx1"/>
-                </a:solidFill>
-                <a:latin typeface="Times"/>
-                <a:cs typeface="Times"/>
-              </a:rPr>
-              <a:t>Correct </a:t>
-            </a:r>
-          </a:p>
-          <a:p>
-            <a:r>
-              <a:rPr lang="en-US" sz="4800" b="0" dirty="0" smtClean="0">
-                <a:solidFill>
-                  <a:schemeClr val="tx1"/>
-                </a:solidFill>
-                <a:latin typeface="Times"/>
-                <a:cs typeface="Times"/>
-              </a:rPr>
-              <a:t>Recognition: </a:t>
-            </a:r>
-            <a:r>
-              <a:rPr lang="en-US" sz="4800" b="0" i="1" dirty="0" smtClean="0">
-                <a:solidFill>
-                  <a:schemeClr val="tx1"/>
-                </a:solidFill>
-                <a:latin typeface="Times"/>
-                <a:cs typeface="Times"/>
-              </a:rPr>
-              <a:t>g</a:t>
-            </a:r>
-            <a:r>
-              <a:rPr lang="en-US" sz="4800" b="0" dirty="0" smtClean="0">
-                <a:solidFill>
-                  <a:schemeClr val="tx1"/>
-                </a:solidFill>
-                <a:latin typeface="Times"/>
-                <a:cs typeface="Times"/>
-              </a:rPr>
-              <a:t> = 0.91, SE = 0.12, </a:t>
-            </a:r>
-            <a:r>
-              <a:rPr lang="en-US" sz="4800" b="0" i="1" dirty="0" smtClean="0">
-                <a:solidFill>
-                  <a:schemeClr val="tx1"/>
-                </a:solidFill>
-                <a:latin typeface="Times"/>
-                <a:cs typeface="Times"/>
-              </a:rPr>
-              <a:t>p</a:t>
-            </a:r>
-            <a:r>
-              <a:rPr lang="en-US" sz="4800" b="0" dirty="0" smtClean="0">
-                <a:solidFill>
-                  <a:schemeClr val="tx1"/>
-                </a:solidFill>
-                <a:latin typeface="Times"/>
-                <a:cs typeface="Times"/>
-              </a:rPr>
-              <a:t> &lt; .0001 </a:t>
-            </a:r>
-          </a:p>
-          <a:p>
-            <a:pPr algn="ctr"/>
-            <a:r>
-              <a:rPr lang="en-US" sz="4800" u="sng" dirty="0" smtClean="0">
-                <a:solidFill>
-                  <a:schemeClr val="tx1"/>
-                </a:solidFill>
-                <a:latin typeface="Times"/>
-                <a:cs typeface="Times"/>
-              </a:rPr>
-              <a:t>Mispronunciation</a:t>
-            </a:r>
-          </a:p>
-          <a:p>
-            <a:r>
-              <a:rPr lang="en-US" sz="4800" b="0" dirty="0" smtClean="0">
-                <a:solidFill>
-                  <a:schemeClr val="tx1"/>
-                </a:solidFill>
-                <a:latin typeface="Times"/>
-                <a:cs typeface="Times"/>
-              </a:rPr>
-              <a:t>Recognition: </a:t>
-            </a:r>
-            <a:r>
-              <a:rPr lang="en-US" sz="4800" b="0" i="1" dirty="0" smtClean="0">
-                <a:solidFill>
-                  <a:schemeClr val="tx1"/>
-                </a:solidFill>
-                <a:latin typeface="Times"/>
-                <a:cs typeface="Times"/>
-              </a:rPr>
-              <a:t>g</a:t>
-            </a:r>
-            <a:r>
-              <a:rPr lang="en-US" sz="4800" b="0" dirty="0" smtClean="0">
-                <a:solidFill>
-                  <a:schemeClr val="tx1"/>
-                </a:solidFill>
-                <a:latin typeface="Times"/>
-                <a:cs typeface="Times"/>
-              </a:rPr>
-              <a:t> = 0.25, SE = 0.06, p &lt; .0001</a:t>
-            </a:r>
-          </a:p>
-          <a:p>
-            <a:pPr algn="ctr"/>
-            <a:r>
-              <a:rPr lang="en-US" sz="4800" u="sng" dirty="0" smtClean="0">
-                <a:solidFill>
-                  <a:schemeClr val="tx1"/>
-                </a:solidFill>
-                <a:latin typeface="Times"/>
-                <a:cs typeface="Times"/>
-              </a:rPr>
-              <a:t>Correct vs. Mispronunciation</a:t>
-            </a:r>
-          </a:p>
-          <a:p>
-            <a:r>
-              <a:rPr lang="en-US" sz="4800" b="0" dirty="0" smtClean="0">
-                <a:solidFill>
-                  <a:schemeClr val="tx1"/>
-                </a:solidFill>
-                <a:latin typeface="Times"/>
-                <a:cs typeface="Times"/>
-              </a:rPr>
-              <a:t>Sensitivity: </a:t>
-            </a:r>
-            <a:r>
-              <a:rPr lang="en-US" sz="4800" b="0" i="1" dirty="0" smtClean="0">
-                <a:solidFill>
-                  <a:schemeClr val="tx1"/>
-                </a:solidFill>
-                <a:latin typeface="Times"/>
-                <a:cs typeface="Times"/>
-              </a:rPr>
-              <a:t>g</a:t>
-            </a:r>
-            <a:r>
-              <a:rPr lang="en-US" sz="4800" b="0" dirty="0" smtClean="0">
-                <a:solidFill>
-                  <a:schemeClr val="tx1"/>
-                </a:solidFill>
-                <a:latin typeface="Times"/>
-                <a:cs typeface="Times"/>
-              </a:rPr>
-              <a:t> = .5, SE = 03, </a:t>
-            </a:r>
-            <a:r>
-              <a:rPr lang="en-US" sz="4800" b="0" i="1" dirty="0" smtClean="0">
-                <a:solidFill>
-                  <a:schemeClr val="tx1"/>
-                </a:solidFill>
-                <a:latin typeface="Times"/>
-                <a:cs typeface="Times"/>
-              </a:rPr>
-              <a:t>p</a:t>
-            </a:r>
-            <a:r>
-              <a:rPr lang="en-US" sz="4800" b="0" dirty="0" smtClean="0">
-                <a:solidFill>
-                  <a:schemeClr val="tx1"/>
-                </a:solidFill>
-                <a:latin typeface="Times"/>
-                <a:cs typeface="Times"/>
-              </a:rPr>
-              <a:t> &lt; .0001</a:t>
-            </a:r>
-          </a:p>
-          <a:p>
-            <a:pPr algn="ctr"/>
-            <a:r>
-              <a:rPr lang="en-US" sz="4800" u="sng" dirty="0" smtClean="0">
-                <a:solidFill>
-                  <a:schemeClr val="tx1"/>
-                </a:solidFill>
-                <a:latin typeface="Times"/>
-                <a:cs typeface="Times"/>
-              </a:rPr>
-              <a:t>Interactions with Age</a:t>
-            </a:r>
-            <a:endParaRPr lang="en-US" sz="4800" u="sng" dirty="0">
-              <a:solidFill>
-                <a:schemeClr val="tx1"/>
-              </a:solidFill>
-              <a:latin typeface="Times"/>
-              <a:cs typeface="Times"/>
-            </a:endParaRPr>
-          </a:p>
-          <a:p>
-            <a:r>
-              <a:rPr lang="en-US" sz="4800" b="0" dirty="0" smtClean="0">
-                <a:solidFill>
-                  <a:schemeClr val="tx1"/>
-                </a:solidFill>
-                <a:latin typeface="Times"/>
-                <a:cs typeface="Times"/>
-              </a:rPr>
-              <a:t>No significant interactions with Age</a:t>
-            </a:r>
-          </a:p>
-          <a:p>
-            <a:endParaRPr lang="en-US" sz="4800" b="0" dirty="0" smtClean="0">
-              <a:solidFill>
-                <a:schemeClr val="tx1"/>
-              </a:solidFill>
-              <a:latin typeface="Times"/>
-              <a:cs typeface="Times"/>
-            </a:endParaRPr>
-          </a:p>
-          <a:p>
-            <a:pPr marL="857250" indent="-857250">
-              <a:buFont typeface="Lucida Grande"/>
-              <a:buChar char="-"/>
-            </a:pPr>
-            <a:r>
-              <a:rPr lang="en-US" sz="4800" b="0" dirty="0" smtClean="0">
-                <a:solidFill>
-                  <a:schemeClr val="tx1"/>
-                </a:solidFill>
-                <a:latin typeface="Times"/>
-                <a:cs typeface="Times"/>
-              </a:rPr>
-              <a:t>Sensitivity to mispronunciations stays consistent as infants age (Theory 3)</a:t>
-            </a:r>
-            <a:endParaRPr lang="en-US" sz="4800" b="0" dirty="0" smtClean="0">
-              <a:solidFill>
-                <a:schemeClr val="tx1"/>
-              </a:solidFill>
-              <a:latin typeface="Times"/>
-              <a:cs typeface="Times"/>
-            </a:endParaRPr>
-          </a:p>
-        </p:txBody>
-      </p:sp>
-      <p:sp>
-        <p:nvSpPr>
           <p:cNvPr id="28" name="TextBox 27"/>
           <p:cNvSpPr txBox="1"/>
           <p:nvPr/>
         </p:nvSpPr>
         <p:spPr>
           <a:xfrm>
-            <a:off x="13893283" y="35443441"/>
+            <a:off x="11897246" y="37891713"/>
             <a:ext cx="3044523" cy="830997"/>
           </a:xfrm>
           <a:prstGeom prst="rect">
@@ -6641,8 +6499,8 @@
         </p:nvSpPr>
         <p:spPr>
           <a:xfrm>
-            <a:off x="13769454" y="36235529"/>
-            <a:ext cx="15985777" cy="1815882"/>
+            <a:off x="11969254" y="38683801"/>
+            <a:ext cx="18305959" cy="2677656"/>
           </a:xfrm>
           <a:prstGeom prst="rect">
             <a:avLst/>
@@ -6666,12 +6524,20 @@
               <a:t>Werker</a:t>
             </a:r>
             <a:r>
+              <a:rPr lang="en-US" sz="2800" dirty="0" smtClean="0">
+                <a:solidFill>
+                  <a:srgbClr val="000000"/>
+                </a:solidFill>
+              </a:rPr>
+              <a:t> </a:t>
+            </a:r>
+            <a:r>
               <a:rPr lang="en-US" sz="2800" dirty="0">
                 <a:solidFill>
                   <a:srgbClr val="000000"/>
                 </a:solidFill>
               </a:rPr>
-              <a:t>, J. F., &amp; Curtin, S. (2005). PRIMIR: A Developmental Framework of Infant Speech Processing. Language Learning and Development, 1(2), 197–</a:t>
+              <a:t>&amp; </a:t>
             </a:r>
             <a:r>
               <a:rPr lang="en-US" sz="2800" dirty="0" smtClean="0">
@@ -6679,8 +6545,108 @@
                   <a:srgbClr val="000000"/>
                 </a:solidFill>
               </a:rPr>
-              <a:t>234</a:t>
-            </a:r>
+              <a:t>Curtin </a:t>
+            </a:r>
+            <a:r>
+              <a:rPr lang="en-US" sz="2800" dirty="0">
+                <a:solidFill>
+                  <a:srgbClr val="000000"/>
+                </a:solidFill>
+              </a:rPr>
+              <a:t>(2005). PRIMIR: A Developmental Framework of Infant Speech Processing. </a:t>
+            </a:r>
+            <a:r>
+              <a:rPr lang="en-US" sz="2800" i="1" dirty="0" smtClean="0">
+                <a:solidFill>
+                  <a:srgbClr val="000000"/>
+                </a:solidFill>
+              </a:rPr>
+              <a:t>Lang Learn </a:t>
+            </a:r>
+            <a:r>
+              <a:rPr lang="en-US" sz="2800" i="1" dirty="0">
+                <a:solidFill>
+                  <a:srgbClr val="000000"/>
+                </a:solidFill>
+              </a:rPr>
+              <a:t>and </a:t>
+            </a:r>
+            <a:r>
+              <a:rPr lang="en-US" sz="2800" i="1" dirty="0" err="1" smtClean="0">
+                <a:solidFill>
+                  <a:srgbClr val="000000"/>
+                </a:solidFill>
+              </a:rPr>
+              <a:t>Dev</a:t>
+            </a:r>
+            <a:endParaRPr lang="en-US" sz="2800" i="1" dirty="0" smtClean="0">
+              <a:solidFill>
+                <a:srgbClr val="000000"/>
+              </a:solidFill>
+            </a:endParaRPr>
+          </a:p>
+          <a:p>
+            <a:pPr marL="514350" indent="-514350">
+              <a:buAutoNum type="arabicPeriod"/>
+            </a:pPr>
+            <a:r>
+              <a:rPr lang="en-US" sz="2800" dirty="0" smtClean="0">
+                <a:solidFill>
+                  <a:srgbClr val="000000"/>
+                </a:solidFill>
+              </a:rPr>
+              <a:t>Best (</a:t>
+            </a:r>
+            <a:r>
+              <a:rPr lang="en-US" sz="2800" dirty="0">
+                <a:solidFill>
+                  <a:srgbClr val="000000"/>
+                </a:solidFill>
+              </a:rPr>
+              <a:t>1994). The emergence of native-language phonological influences in infants: A perceptual assimilation model. </a:t>
+            </a:r>
+            <a:r>
+              <a:rPr lang="en-US" sz="2800" i="1" dirty="0">
+                <a:solidFill>
+                  <a:srgbClr val="000000"/>
+                </a:solidFill>
+              </a:rPr>
+              <a:t>Haskins Laboratories Status Report on Speech </a:t>
+            </a:r>
+            <a:r>
+              <a:rPr lang="en-US" sz="2800" i="1" dirty="0" smtClean="0">
+                <a:solidFill>
+                  <a:srgbClr val="000000"/>
+                </a:solidFill>
+              </a:rPr>
+              <a:t>Research</a:t>
+            </a:r>
+          </a:p>
+          <a:p>
+            <a:pPr marL="514350" indent="-514350">
+              <a:buAutoNum type="arabicPeriod"/>
+            </a:pPr>
+            <a:r>
+              <a:rPr lang="en-US" sz="2800" dirty="0" smtClean="0">
+                <a:solidFill>
+                  <a:srgbClr val="000000"/>
+                </a:solidFill>
+              </a:rPr>
+              <a:t>White &amp; Morgan (2008). Sub-segmental detail in early lexical representations. </a:t>
+            </a:r>
+            <a:r>
+              <a:rPr lang="en-US" sz="2800" i="1" dirty="0" smtClean="0">
+                <a:solidFill>
+                  <a:srgbClr val="000000"/>
+                </a:solidFill>
+              </a:rPr>
+              <a:t>Journal of Memory and Cognition</a:t>
+            </a:r>
+            <a:endParaRPr lang="en-US" sz="2800" dirty="0" smtClean="0">
+              <a:solidFill>
+                <a:srgbClr val="000000"/>
+              </a:solidFill>
+            </a:endParaRPr>
           </a:p>
           <a:p>
             <a:pPr marL="514350" indent="-514350">
@@ -6693,7 +6659,23 @@
                   <a:srgbClr val="000000"/>
                 </a:solidFill>
               </a:rPr>
-              <a:t>Best, C. T. (1994). The emergence of native-language phonological influences in infants: A perceptual assimilation model. Haskins Laboratories Status Report on Speech </a:t>
+              <a:t>Mani &amp; Plunkett (2011). Does size matter? </a:t>
+            </a:r>
+            <a:r>
+              <a:rPr lang="en-US" sz="2800" dirty="0" err="1">
+                <a:solidFill>
+                  <a:srgbClr val="000000"/>
+                </a:solidFill>
+              </a:rPr>
+              <a:t>Subsegmental</a:t>
+            </a:r>
+            <a:r>
+              <a:rPr lang="en-US" sz="2800" dirty="0">
+                <a:solidFill>
+                  <a:srgbClr val="000000"/>
+                </a:solidFill>
+              </a:rPr>
+              <a:t> cues to vowel mispronunciation </a:t>
             </a:r>
             <a:r>
               <a:rPr lang="en-US" sz="2800" dirty="0" smtClean="0">
@@ -6701,7 +6683,49 @@
                   <a:srgbClr val="000000"/>
                 </a:solidFill>
               </a:rPr>
-              <a:t>Research</a:t>
+              <a:t>detection. </a:t>
+            </a:r>
+            <a:r>
+              <a:rPr lang="en-US" sz="2800" i="1" dirty="0" smtClean="0">
+                <a:solidFill>
+                  <a:srgbClr val="000000"/>
+                </a:solidFill>
+              </a:rPr>
+              <a:t>J of Child Lang</a:t>
+            </a:r>
+            <a:endParaRPr lang="en-US" sz="2800" dirty="0" smtClean="0">
+              <a:solidFill>
+                <a:srgbClr val="000000"/>
+              </a:solidFill>
+            </a:endParaRPr>
+          </a:p>
+          <a:p>
+            <a:pPr marL="514350" indent="-514350">
+              <a:buAutoNum type="arabicPeriod"/>
+            </a:pPr>
+            <a:r>
+              <a:rPr lang="en-US" sz="2800" dirty="0" err="1" smtClean="0">
+                <a:solidFill>
+                  <a:srgbClr val="000000"/>
+                </a:solidFill>
+              </a:rPr>
+              <a:t>Halberda</a:t>
+            </a:r>
+            <a:r>
+              <a:rPr lang="en-US" sz="2800" dirty="0" smtClean="0">
+                <a:solidFill>
+                  <a:srgbClr val="000000"/>
+                </a:solidFill>
+              </a:rPr>
+              <a:t> (2003). The development of a word-learning strategy. </a:t>
+            </a:r>
+            <a:r>
+              <a:rPr lang="en-US" sz="2800" i="1" dirty="0" smtClean="0">
+                <a:solidFill>
+                  <a:srgbClr val="000000"/>
+                </a:solidFill>
+              </a:rPr>
+              <a:t>Cognition</a:t>
             </a:r>
             <a:endParaRPr lang="en-US" sz="2800" dirty="0">
               <a:solidFill>
@@ -6719,7 +6743,7 @@
         </p:nvSpPr>
         <p:spPr>
           <a:xfrm>
-            <a:off x="13769454" y="7792369"/>
+            <a:off x="13769454" y="6784257"/>
             <a:ext cx="16201800" cy="3888432"/>
           </a:xfrm>
           <a:prstGeom prst="roundRect">
@@ -6781,47 +6805,37 @@
                 <a:latin typeface="Times"/>
                 <a:cs typeface="Times"/>
               </a:rPr>
-              <a:t>32</a:t>
-            </a:r>
-            <a:r>
-              <a:rPr lang="en-US" sz="4800" b="0" dirty="0" smtClean="0">
+              <a:t>32 </a:t>
+            </a:r>
+            <a:r>
+              <a:rPr lang="en-US" sz="4800" b="0" dirty="0">
                 <a:solidFill>
                   <a:schemeClr val="tx1"/>
                 </a:solidFill>
                 <a:latin typeface="Times"/>
                 <a:cs typeface="Times"/>
               </a:rPr>
-              <a:t> </a:t>
-            </a:r>
-            <a:r>
-              <a:rPr lang="en-US" sz="4800" b="0" dirty="0">
+              <a:t>papers </a:t>
+            </a:r>
+            <a:r>
+              <a:rPr lang="en-US" sz="4800" b="0" dirty="0" smtClean="0">
                 <a:solidFill>
                   <a:schemeClr val="tx1"/>
                 </a:solidFill>
                 <a:latin typeface="Times"/>
                 <a:cs typeface="Times"/>
               </a:rPr>
-              <a:t>papers </a:t>
-            </a:r>
-            <a:r>
-              <a:rPr lang="en-US" sz="4800" b="0" dirty="0" smtClean="0">
+              <a:t>(27 journal </a:t>
+            </a:r>
+            <a:r>
+              <a:rPr lang="en-US" sz="4800" b="0" dirty="0">
                 <a:solidFill>
                   <a:schemeClr val="tx1"/>
                 </a:solidFill>
                 <a:latin typeface="Times"/>
                 <a:cs typeface="Times"/>
               </a:rPr>
-              <a:t>(</a:t>
-            </a:r>
-            <a:r>
-              <a:rPr lang="en-US" sz="4800" b="0" dirty="0">
-                <a:solidFill>
-                  <a:schemeClr val="tx1"/>
-                </a:solidFill>
-                <a:latin typeface="Times"/>
-                <a:cs typeface="Times"/>
-              </a:rPr>
-              <a:t>mostly journal articles)</a:t>
+              <a:t>articles)</a:t>
             </a:r>
           </a:p>
           <a:p>
@@ -6863,17 +6877,7 @@
                 <a:latin typeface="Times"/>
                 <a:cs typeface="Times"/>
               </a:rPr>
-              <a:t>2252</a:t>
-            </a:r>
-            <a:r>
-              <a:rPr lang="en-US" sz="4800" b="0" dirty="0" smtClean="0">
-                <a:solidFill>
-                  <a:schemeClr val="tx1"/>
-                </a:solidFill>
-                <a:latin typeface="Times"/>
-                <a:cs typeface="Times"/>
-              </a:rPr>
-              <a:t> </a:t>
+              <a:t>2252 </a:t>
             </a:r>
             <a:r>
               <a:rPr lang="en-US" sz="4800" b="0" dirty="0">
@@ -6929,17 +6933,7 @@
                 <a:latin typeface="Times"/>
                 <a:cs typeface="Times"/>
               </a:rPr>
-              <a:t>31</a:t>
-            </a:r>
-            <a:r>
-              <a:rPr lang="en-US" sz="4800" b="0" dirty="0" smtClean="0">
-                <a:solidFill>
-                  <a:schemeClr val="tx1"/>
-                </a:solidFill>
-                <a:latin typeface="Times"/>
-                <a:cs typeface="Times"/>
-              </a:rPr>
-              <a:t> months</a:t>
+              <a:t>31 months-of-age</a:t>
             </a:r>
           </a:p>
         </p:txBody>
@@ -7005,15 +6999,15 @@
           <p:nvPr/>
         </p:nvPicPr>
         <p:blipFill>
-          <a:blip r:embed="rId12"/>
+          <a:blip r:embed="rId8"/>
           <a:stretch>
             <a:fillRect/>
           </a:stretch>
         </p:blipFill>
         <p:spPr>
           <a:xfrm>
-            <a:off x="880022" y="6140049"/>
-            <a:ext cx="4330700" cy="788224"/>
+            <a:off x="381762" y="1671689"/>
+            <a:ext cx="5538820" cy="1008112"/>
           </a:xfrm>
           <a:prstGeom prst="rect">
             <a:avLst/>
@@ -7029,14 +7023,14 @@
           <p:nvPr/>
         </p:nvPicPr>
         <p:blipFill>
-          <a:blip r:embed="rId13"/>
+          <a:blip r:embed="rId9"/>
           <a:stretch>
             <a:fillRect/>
           </a:stretch>
         </p:blipFill>
         <p:spPr>
           <a:xfrm>
-            <a:off x="6352630" y="10240641"/>
+            <a:off x="6352630" y="9232529"/>
             <a:ext cx="6514767" cy="6336704"/>
           </a:xfrm>
           <a:prstGeom prst="rect">
@@ -7044,30 +7038,6 @@
           </a:prstGeom>
         </p:spPr>
       </p:pic>
-      <p:pic>
-        <p:nvPicPr>
-          <p:cNvPr id="13" name="Picture 12"/>
-          <p:cNvPicPr>
-            <a:picLocks noChangeAspect="1"/>
-          </p:cNvPicPr>
-          <p:nvPr/>
-        </p:nvPicPr>
-        <p:blipFill>
-          <a:blip r:embed="rId14"/>
-          <a:stretch>
-            <a:fillRect/>
-          </a:stretch>
-        </p:blipFill>
-        <p:spPr>
-          <a:xfrm>
-            <a:off x="231950" y="22554009"/>
-            <a:ext cx="13681520" cy="9121013"/>
-          </a:xfrm>
-          <a:prstGeom prst="rect">
-            <a:avLst/>
-          </a:prstGeom>
-        </p:spPr>
-      </p:pic>
       <p:sp>
         <p:nvSpPr>
           <p:cNvPr id="35" name="Rounded Rectangle 34"/>
@@ -7076,8 +7046,8 @@
         </p:nvSpPr>
         <p:spPr>
           <a:xfrm>
-            <a:off x="13769454" y="15857265"/>
-            <a:ext cx="16201800" cy="1872208"/>
+            <a:off x="13769454" y="15353209"/>
+            <a:ext cx="16201800" cy="6984776"/>
           </a:xfrm>
           <a:prstGeom prst="roundRect">
             <a:avLst/>
@@ -7124,6 +7094,69 @@
               </a:rPr>
               <a:t>Does the number of phonological features changed modulate mispronunciation sensitivity?</a:t>
             </a:r>
+          </a:p>
+          <a:p>
+            <a:pPr algn="ctr"/>
+            <a:endParaRPr lang="en-US" sz="4800" u="sng" dirty="0" smtClean="0">
+              <a:solidFill>
+                <a:schemeClr val="tx1"/>
+              </a:solidFill>
+              <a:latin typeface="Times"/>
+              <a:cs typeface="Times"/>
+            </a:endParaRPr>
+          </a:p>
+          <a:p>
+            <a:pPr algn="ctr"/>
+            <a:endParaRPr lang="en-US" sz="4800" b="0" i="1" u="sng" dirty="0">
+              <a:solidFill>
+                <a:schemeClr val="tx1"/>
+              </a:solidFill>
+              <a:latin typeface="Times"/>
+              <a:cs typeface="Times"/>
+            </a:endParaRPr>
+          </a:p>
+          <a:p>
+            <a:pPr algn="ctr"/>
+            <a:endParaRPr lang="en-US" sz="4800" b="0" i="1" u="sng" dirty="0" smtClean="0">
+              <a:solidFill>
+                <a:schemeClr val="tx1"/>
+              </a:solidFill>
+              <a:latin typeface="Times"/>
+              <a:cs typeface="Times"/>
+            </a:endParaRPr>
+          </a:p>
+          <a:p>
+            <a:pPr algn="ctr"/>
+            <a:endParaRPr lang="en-US" sz="4800" b="0" i="1" u="sng" dirty="0">
+              <a:solidFill>
+                <a:schemeClr val="tx1"/>
+              </a:solidFill>
+              <a:latin typeface="Times"/>
+              <a:cs typeface="Times"/>
+            </a:endParaRPr>
+          </a:p>
+          <a:p>
+            <a:pPr algn="ctr"/>
+            <a:endParaRPr lang="en-US" sz="4800" b="0" i="1" u="sng" dirty="0" smtClean="0">
+              <a:solidFill>
+                <a:schemeClr val="tx1"/>
+              </a:solidFill>
+              <a:latin typeface="Times"/>
+              <a:cs typeface="Times"/>
+            </a:endParaRPr>
+          </a:p>
+          <a:p>
+            <a:pPr algn="ctr"/>
+            <a:endParaRPr lang="en-US" sz="4800" b="0" i="1" u="sng" dirty="0">
+              <a:solidFill>
+                <a:schemeClr val="tx1"/>
+              </a:solidFill>
+              <a:latin typeface="Times"/>
+              <a:cs typeface="Times"/>
+            </a:endParaRPr>
+          </a:p>
+          <a:p>
+            <a:pPr algn="ctr"/>
             <a:endParaRPr lang="en-US" sz="4800" b="0" i="1" dirty="0" smtClean="0">
               <a:solidFill>
                 <a:schemeClr val="tx1"/>
@@ -7136,14 +7169,14 @@
       </p:sp>
       <p:sp>
         <p:nvSpPr>
-          <p:cNvPr id="38" name="Rounded Rectangle 37"/>
+          <p:cNvPr id="41" name="Rounded Rectangle 40"/>
           <p:cNvSpPr/>
           <p:nvPr/>
         </p:nvSpPr>
         <p:spPr>
           <a:xfrm>
-            <a:off x="21834350" y="18017505"/>
-            <a:ext cx="8136904" cy="8064896"/>
+            <a:off x="13769454" y="22842041"/>
+            <a:ext cx="16201800" cy="7056784"/>
           </a:xfrm>
           <a:prstGeom prst="roundRect">
             <a:avLst/>
@@ -7181,252 +7214,19 @@
           <a:p>
             <a:pPr algn="ctr"/>
             <a:r>
-              <a:rPr lang="en-US" sz="3600" u="sng" dirty="0" smtClean="0">
+              <a:rPr lang="en-US" sz="4800" u="sng" dirty="0" smtClean="0">
                 <a:solidFill>
                   <a:schemeClr val="tx1"/>
                 </a:solidFill>
                 <a:latin typeface="Times"/>
                 <a:cs typeface="Times"/>
               </a:rPr>
-              <a:t>Features</a:t>
-            </a:r>
-          </a:p>
-          <a:p>
-            <a:r>
-              <a:rPr lang="en-US" sz="3600" b="0" dirty="0" smtClean="0">
-                <a:solidFill>
-                  <a:schemeClr val="tx1"/>
-                </a:solidFill>
-                <a:latin typeface="Times"/>
-                <a:cs typeface="Times"/>
-              </a:rPr>
-              <a:t>1: </a:t>
-            </a:r>
-            <a:r>
-              <a:rPr lang="en-US" sz="3600" b="0" i="1" dirty="0" smtClean="0">
-                <a:solidFill>
-                  <a:schemeClr val="tx1"/>
-                </a:solidFill>
-                <a:latin typeface="Times"/>
-                <a:cs typeface="Times"/>
-              </a:rPr>
-              <a:t>g</a:t>
-            </a:r>
-            <a:r>
-              <a:rPr lang="en-US" sz="3600" b="0" dirty="0" smtClean="0">
-                <a:solidFill>
-                  <a:schemeClr val="tx1"/>
-                </a:solidFill>
-                <a:latin typeface="Times"/>
-                <a:cs typeface="Times"/>
-              </a:rPr>
-              <a:t> = -0.51, SE = 0.04, </a:t>
-            </a:r>
-            <a:r>
-              <a:rPr lang="en-US" sz="3600" b="0" i="1" dirty="0" smtClean="0">
-                <a:solidFill>
-                  <a:schemeClr val="tx1"/>
-                </a:solidFill>
-                <a:latin typeface="Times"/>
-                <a:cs typeface="Times"/>
-              </a:rPr>
-              <a:t>p</a:t>
-            </a:r>
-            <a:r>
-              <a:rPr lang="en-US" sz="3600" b="0" dirty="0" smtClean="0">
-                <a:solidFill>
-                  <a:schemeClr val="tx1"/>
-                </a:solidFill>
-                <a:latin typeface="Times"/>
-                <a:cs typeface="Times"/>
-              </a:rPr>
-              <a:t> &lt; .0001</a:t>
-            </a:r>
-          </a:p>
-          <a:p>
-            <a:r>
-              <a:rPr lang="en-US" sz="3600" b="0" dirty="0" smtClean="0">
-                <a:solidFill>
-                  <a:schemeClr val="tx1"/>
-                </a:solidFill>
-                <a:latin typeface="Times"/>
-                <a:cs typeface="Times"/>
-              </a:rPr>
-              <a:t>2</a:t>
-            </a:r>
-            <a:r>
-              <a:rPr lang="en-US" sz="3600" b="0" dirty="0">
-                <a:solidFill>
-                  <a:schemeClr val="tx1"/>
-                </a:solidFill>
-                <a:latin typeface="Times"/>
-                <a:cs typeface="Times"/>
-              </a:rPr>
-              <a:t>: </a:t>
-            </a:r>
-            <a:r>
-              <a:rPr lang="en-US" sz="3600" b="0" i="1" dirty="0">
-                <a:solidFill>
-                  <a:schemeClr val="tx1"/>
-                </a:solidFill>
-                <a:latin typeface="Times"/>
-                <a:cs typeface="Times"/>
-              </a:rPr>
-              <a:t>g</a:t>
-            </a:r>
-            <a:r>
-              <a:rPr lang="en-US" sz="3600" b="0" dirty="0">
-                <a:solidFill>
-                  <a:schemeClr val="tx1"/>
-                </a:solidFill>
-                <a:latin typeface="Times"/>
-                <a:cs typeface="Times"/>
-              </a:rPr>
-              <a:t> = -</a:t>
-            </a:r>
-            <a:r>
-              <a:rPr lang="en-US" sz="3600" b="0" dirty="0" smtClean="0">
-                <a:solidFill>
-                  <a:schemeClr val="tx1"/>
-                </a:solidFill>
-                <a:latin typeface="Times"/>
-                <a:cs typeface="Times"/>
-              </a:rPr>
-              <a:t>0.48, </a:t>
-            </a:r>
-            <a:r>
-              <a:rPr lang="en-US" sz="3600" b="0" dirty="0">
-                <a:solidFill>
-                  <a:schemeClr val="tx1"/>
-                </a:solidFill>
-                <a:latin typeface="Times"/>
-                <a:cs typeface="Times"/>
-              </a:rPr>
-              <a:t>SE = </a:t>
-            </a:r>
-            <a:r>
-              <a:rPr lang="en-US" sz="3600" b="0" dirty="0" smtClean="0">
-                <a:solidFill>
-                  <a:schemeClr val="tx1"/>
-                </a:solidFill>
-                <a:latin typeface="Times"/>
-                <a:cs typeface="Times"/>
-              </a:rPr>
-              <a:t>0.07, </a:t>
-            </a:r>
-            <a:r>
-              <a:rPr lang="en-US" sz="3600" b="0" i="1" dirty="0">
-                <a:solidFill>
-                  <a:schemeClr val="tx1"/>
-                </a:solidFill>
-                <a:latin typeface="Times"/>
-                <a:cs typeface="Times"/>
-              </a:rPr>
-              <a:t>p</a:t>
-            </a:r>
-            <a:r>
-              <a:rPr lang="en-US" sz="3600" b="0" dirty="0">
-                <a:solidFill>
-                  <a:schemeClr val="tx1"/>
-                </a:solidFill>
-                <a:latin typeface="Times"/>
-                <a:cs typeface="Times"/>
-              </a:rPr>
-              <a:t> &lt; .</a:t>
-            </a:r>
-            <a:r>
-              <a:rPr lang="en-US" sz="3600" b="0" dirty="0" smtClean="0">
-                <a:solidFill>
-                  <a:schemeClr val="tx1"/>
-                </a:solidFill>
-                <a:latin typeface="Times"/>
-                <a:cs typeface="Times"/>
-              </a:rPr>
-              <a:t>0001</a:t>
-            </a:r>
-          </a:p>
-          <a:p>
-            <a:r>
-              <a:rPr lang="en-US" sz="3600" b="0" dirty="0" smtClean="0">
-                <a:solidFill>
-                  <a:schemeClr val="tx1"/>
-                </a:solidFill>
-                <a:latin typeface="Times"/>
-                <a:cs typeface="Times"/>
-              </a:rPr>
-              <a:t>3: </a:t>
-            </a:r>
-            <a:r>
-              <a:rPr lang="en-US" sz="3600" b="0" i="1" dirty="0">
-                <a:solidFill>
-                  <a:schemeClr val="tx1"/>
-                </a:solidFill>
-                <a:latin typeface="Times"/>
-                <a:cs typeface="Times"/>
-              </a:rPr>
-              <a:t>g</a:t>
-            </a:r>
-            <a:r>
-              <a:rPr lang="en-US" sz="3600" b="0" dirty="0">
-                <a:solidFill>
-                  <a:schemeClr val="tx1"/>
-                </a:solidFill>
-                <a:latin typeface="Times"/>
-                <a:cs typeface="Times"/>
-              </a:rPr>
-              <a:t> = -</a:t>
-            </a:r>
-            <a:r>
-              <a:rPr lang="en-US" sz="3600" b="0" dirty="0" smtClean="0">
-                <a:solidFill>
-                  <a:schemeClr val="tx1"/>
-                </a:solidFill>
-                <a:latin typeface="Times"/>
-                <a:cs typeface="Times"/>
-              </a:rPr>
-              <a:t>0.69, </a:t>
-            </a:r>
-            <a:r>
-              <a:rPr lang="en-US" sz="3600" b="0" dirty="0">
-                <a:solidFill>
-                  <a:schemeClr val="tx1"/>
-                </a:solidFill>
-                <a:latin typeface="Times"/>
-                <a:cs typeface="Times"/>
-              </a:rPr>
-              <a:t>SE = </a:t>
-            </a:r>
-            <a:r>
-              <a:rPr lang="en-US" sz="3600" b="0" dirty="0" smtClean="0">
-                <a:solidFill>
-                  <a:schemeClr val="tx1"/>
-                </a:solidFill>
-                <a:latin typeface="Times"/>
-                <a:cs typeface="Times"/>
-              </a:rPr>
-              <a:t>0.10, </a:t>
-            </a:r>
-            <a:r>
-              <a:rPr lang="en-US" sz="3600" b="0" i="1" dirty="0">
-                <a:solidFill>
-                  <a:schemeClr val="tx1"/>
-                </a:solidFill>
-                <a:latin typeface="Times"/>
-                <a:cs typeface="Times"/>
-              </a:rPr>
-              <a:t>p</a:t>
-            </a:r>
-            <a:r>
-              <a:rPr lang="en-US" sz="3600" b="0" dirty="0">
-                <a:solidFill>
-                  <a:schemeClr val="tx1"/>
-                </a:solidFill>
-                <a:latin typeface="Times"/>
-                <a:cs typeface="Times"/>
-              </a:rPr>
-              <a:t> &lt; .0001</a:t>
-            </a:r>
-            <a:endParaRPr lang="en-US" sz="3600" b="0" dirty="0" smtClean="0">
+              <a:t>Does familiarity with the distractor image modulate mispronunciation sensitivity?</a:t>
+            </a:r>
+          </a:p>
+          <a:p>
+            <a:pPr algn="ctr"/>
+            <a:endParaRPr lang="en-US" sz="4800" b="0" i="1" u="sng" dirty="0">
               <a:solidFill>
                 <a:schemeClr val="tx1"/>
               </a:solidFill>
@@ -7436,29 +7236,7 @@
           </a:p>
           <a:p>
             <a:pPr algn="ctr"/>
-            <a:r>
-              <a:rPr lang="en-US" sz="3600" u="sng" dirty="0" smtClean="0">
-                <a:solidFill>
-                  <a:schemeClr val="tx1"/>
-                </a:solidFill>
-                <a:latin typeface="Times"/>
-                <a:cs typeface="Times"/>
-              </a:rPr>
-              <a:t>Interactions with Age</a:t>
-            </a:r>
-          </a:p>
-          <a:p>
-            <a:r>
-              <a:rPr lang="en-US" sz="3600" b="0" dirty="0" smtClean="0">
-                <a:solidFill>
-                  <a:schemeClr val="tx1"/>
-                </a:solidFill>
-                <a:latin typeface="Times"/>
-                <a:cs typeface="Times"/>
-              </a:rPr>
-              <a:t>No significant interactions with Age</a:t>
-            </a:r>
-            <a:endParaRPr lang="en-US" sz="3600" b="0" i="1" dirty="0" smtClean="0">
+            <a:endParaRPr lang="en-US" sz="4800" b="0" i="1" u="sng" dirty="0" smtClean="0">
               <a:solidFill>
                 <a:schemeClr val="tx1"/>
               </a:solidFill>
@@ -7467,7 +7245,8 @@
             </a:endParaRPr>
           </a:p>
           <a:p>
-            <a:endParaRPr lang="en-US" sz="3600" b="0" i="1" dirty="0">
+            <a:pPr algn="ctr"/>
+            <a:endParaRPr lang="en-US" sz="4800" b="0" i="1" u="sng" dirty="0">
               <a:solidFill>
                 <a:schemeClr val="tx1"/>
               </a:solidFill>
@@ -7476,43 +7255,8 @@
             </a:endParaRPr>
           </a:p>
           <a:p>
-            <a:pPr marL="571500" indent="-571500">
-              <a:buFontTx/>
-              <a:buChar char="-"/>
-            </a:pPr>
-            <a:r>
-              <a:rPr lang="en-US" sz="3600" b="0" dirty="0" smtClean="0">
-                <a:solidFill>
-                  <a:schemeClr val="tx1"/>
-                </a:solidFill>
-                <a:latin typeface="Times"/>
-                <a:cs typeface="Times"/>
-              </a:rPr>
-              <a:t>Sensitivity to mispronunciations increases as the number of features changed increases</a:t>
-            </a:r>
-          </a:p>
-          <a:p>
-            <a:pPr marL="571500" indent="-571500">
-              <a:buFontTx/>
-              <a:buChar char="-"/>
-            </a:pPr>
-            <a:r>
-              <a:rPr lang="en-US" sz="3600" b="0" dirty="0" smtClean="0">
-                <a:solidFill>
-                  <a:schemeClr val="tx1"/>
-                </a:solidFill>
-                <a:latin typeface="Times"/>
-                <a:cs typeface="Times"/>
-              </a:rPr>
-              <a:t>Stays consistent as infants age</a:t>
-            </a:r>
-          </a:p>
-          <a:p>
-            <a:pPr marL="571500" indent="-571500">
-              <a:buFontTx/>
-              <a:buChar char="-"/>
-            </a:pPr>
-            <a:endParaRPr lang="en-US" sz="3600" b="0" dirty="0">
+            <a:pPr algn="ctr"/>
+            <a:endParaRPr lang="en-US" sz="4800" b="0" i="1" u="sng" dirty="0" smtClean="0">
               <a:solidFill>
                 <a:schemeClr val="tx1"/>
               </a:solidFill>
@@ -7522,27 +7266,7 @@
           </a:p>
           <a:p>
             <a:pPr algn="ctr"/>
-            <a:r>
-              <a:rPr lang="en-US" sz="3600" b="0" i="1" dirty="0">
-                <a:solidFill>
-                  <a:schemeClr val="tx1"/>
-                </a:solidFill>
-                <a:latin typeface="Times"/>
-                <a:cs typeface="Times"/>
-              </a:rPr>
-              <a:t>*Focus on ages where feature manipulated</a:t>
-            </a:r>
-            <a:r>
-              <a:rPr lang="en-US" sz="3600" b="0" i="1" dirty="0" smtClean="0">
-                <a:solidFill>
-                  <a:schemeClr val="tx1"/>
-                </a:solidFill>
-                <a:latin typeface="Times"/>
-                <a:cs typeface="Times"/>
-              </a:rPr>
-              <a:t>*</a:t>
-            </a:r>
-            <a:endParaRPr lang="en-US" sz="3600" b="0" i="1" dirty="0">
+            <a:endParaRPr lang="en-US" sz="4800" b="0" i="1" u="sng" dirty="0" smtClean="0">
               <a:solidFill>
                 <a:schemeClr val="tx1"/>
               </a:solidFill>
@@ -7550,18 +7274,38 @@
               <a:cs typeface="Times"/>
             </a:endParaRPr>
           </a:p>
-        </p:txBody>
-      </p:sp>
-      <p:sp>
-        <p:nvSpPr>
-          <p:cNvPr id="41" name="Rounded Rectangle 40"/>
+          <a:p>
+            <a:pPr algn="ctr"/>
+            <a:endParaRPr lang="en-US" sz="4800" b="0" i="1" u="sng" dirty="0">
+              <a:solidFill>
+                <a:schemeClr val="tx1"/>
+              </a:solidFill>
+              <a:latin typeface="Times"/>
+              <a:cs typeface="Times"/>
+            </a:endParaRPr>
+          </a:p>
+          <a:p>
+            <a:pPr algn="ctr"/>
+            <a:endParaRPr lang="en-US" sz="4800" b="0" i="1" u="sng" dirty="0" smtClean="0">
+              <a:solidFill>
+                <a:schemeClr val="tx1"/>
+              </a:solidFill>
+              <a:latin typeface="Times"/>
+              <a:cs typeface="Times"/>
+            </a:endParaRPr>
+          </a:p>
+        </p:txBody>
+      </p:sp>
+      <p:sp>
+        <p:nvSpPr>
+          <p:cNvPr id="36" name="Rounded Rectangle 35"/>
           <p:cNvSpPr/>
           <p:nvPr/>
         </p:nvSpPr>
         <p:spPr>
           <a:xfrm>
-            <a:off x="13769454" y="26442441"/>
-            <a:ext cx="16201800" cy="1872208"/>
+            <a:off x="13769454" y="30402881"/>
+            <a:ext cx="15913768" cy="7632848"/>
           </a:xfrm>
           <a:prstGeom prst="roundRect">
             <a:avLst/>
@@ -7606,9 +7350,9 @@
                 <a:latin typeface="Times"/>
                 <a:cs typeface="Times"/>
               </a:rPr>
-              <a:t>Does familiarity with the distractor image modulate mispronunciation sensitivity?</a:t>
-            </a:r>
-            <a:endParaRPr lang="en-US" sz="4800" b="0" i="1" dirty="0" smtClean="0">
+              <a:t>Conclusions</a:t>
+            </a:r>
+            <a:endParaRPr lang="en-US" sz="4800" b="0" dirty="0" smtClean="0">
               <a:solidFill>
                 <a:schemeClr val="tx1"/>
               </a:solidFill>
@@ -7616,152 +7360,74 @@
               <a:cs typeface="Times"/>
             </a:endParaRPr>
           </a:p>
-        </p:txBody>
-      </p:sp>
-      <p:sp>
-        <p:nvSpPr>
-          <p:cNvPr id="42" name="Rounded Rectangle 41"/>
-          <p:cNvSpPr/>
-          <p:nvPr/>
-        </p:nvSpPr>
-        <p:spPr>
-          <a:xfrm>
-            <a:off x="13553430" y="28674689"/>
-            <a:ext cx="8136904" cy="6768752"/>
-          </a:xfrm>
-          <a:prstGeom prst="roundRect">
-            <a:avLst/>
-          </a:prstGeom>
-          <a:solidFill>
-            <a:schemeClr val="bg1">
-              <a:lumMod val="85000"/>
-            </a:schemeClr>
-          </a:solidFill>
-          <a:ln>
-            <a:solidFill>
-              <a:schemeClr val="tx1"/>
-            </a:solidFill>
-          </a:ln>
-        </p:spPr>
-        <p:style>
-          <a:lnRef idx="2">
-            <a:schemeClr val="accent1">
-              <a:shade val="50000"/>
-            </a:schemeClr>
-          </a:lnRef>
-          <a:fillRef idx="1">
-            <a:schemeClr val="accent1"/>
-          </a:fillRef>
-          <a:effectRef idx="0">
-            <a:schemeClr val="accent1"/>
-          </a:effectRef>
-          <a:fontRef idx="minor">
-            <a:schemeClr val="lt1"/>
-          </a:fontRef>
-        </p:style>
-        <p:txBody>
-          <a:bodyPr rtlCol="0" anchor="ctr"/>
-          <a:lstStyle/>
-          <a:p>
-            <a:pPr algn="ctr"/>
-            <a:r>
-              <a:rPr lang="en-US" sz="3600" u="sng" dirty="0" smtClean="0">
+          <a:p>
+            <a:pPr marL="685800" indent="-685800">
+              <a:buFont typeface="Wingdings" charset="2"/>
+              <a:buChar char="§"/>
+            </a:pPr>
+            <a:r>
+              <a:rPr lang="en-US" sz="4800" b="0" dirty="0" smtClean="0">
                 <a:solidFill>
                   <a:schemeClr val="tx1"/>
                 </a:solidFill>
                 <a:latin typeface="Times"/>
                 <a:cs typeface="Times"/>
               </a:rPr>
-              <a:t>Distractor Familiarity</a:t>
-            </a:r>
-          </a:p>
-          <a:p>
-            <a:r>
-              <a:rPr lang="en-US" sz="3600" b="0" dirty="0" smtClean="0">
+              <a:t>Sensitivity to mispronunciations stays consistent as infants age (Theory 3)</a:t>
+            </a:r>
+          </a:p>
+          <a:p>
+            <a:pPr marL="685800" indent="-685800">
+              <a:buFont typeface="Wingdings" charset="2"/>
+              <a:buChar char="§"/>
+            </a:pPr>
+            <a:r>
+              <a:rPr lang="en-US" sz="4800" b="0" dirty="0">
                 <a:solidFill>
                   <a:schemeClr val="tx1"/>
                 </a:solidFill>
                 <a:latin typeface="Times"/>
                 <a:cs typeface="Times"/>
               </a:rPr>
-              <a:t>Sensitivity</a:t>
-            </a:r>
-            <a:r>
-              <a:rPr lang="en-US" sz="3600" b="0" dirty="0" smtClean="0">
+              <a:t>Sensitivity to mispronunciations increases as the number of features changed </a:t>
+            </a:r>
+            <a:r>
+              <a:rPr lang="en-US" sz="4800" b="0" dirty="0" smtClean="0">
                 <a:solidFill>
                   <a:schemeClr val="tx1"/>
                 </a:solidFill>
                 <a:latin typeface="Times"/>
                 <a:cs typeface="Times"/>
               </a:rPr>
-              <a:t>: </a:t>
-            </a:r>
-            <a:r>
-              <a:rPr lang="en-US" sz="3600" b="0" i="1" dirty="0" smtClean="0">
+              <a:t>increases; consistent as infants age</a:t>
+            </a:r>
+          </a:p>
+          <a:p>
+            <a:pPr marL="2678823" lvl="1" indent="-685800">
+              <a:buFont typeface="Wingdings" charset="2"/>
+              <a:buChar char="§"/>
+            </a:pPr>
+            <a:r>
+              <a:rPr lang="en-US" sz="4800" b="0" dirty="0" smtClean="0">
                 <a:solidFill>
                   <a:schemeClr val="tx1"/>
                 </a:solidFill>
                 <a:latin typeface="Times"/>
                 <a:cs typeface="Times"/>
               </a:rPr>
-              <a:t>g</a:t>
-            </a:r>
-            <a:r>
-              <a:rPr lang="en-US" sz="3600" b="0" dirty="0" smtClean="0">
+              <a:t>Infants are sensitive to size of mispronunciation</a:t>
+            </a:r>
+            <a:r>
+              <a:rPr lang="en-US" sz="4800" b="0" baseline="30000" dirty="0">
                 <a:solidFill>
                   <a:schemeClr val="tx1"/>
                 </a:solidFill>
                 <a:latin typeface="Times"/>
                 <a:cs typeface="Times"/>
               </a:rPr>
-              <a:t> = 0.19, SE = 0.09, </a:t>
-            </a:r>
-            <a:r>
-              <a:rPr lang="en-US" sz="3600" b="0" i="1" dirty="0" smtClean="0">
-                <a:solidFill>
-                  <a:schemeClr val="tx1"/>
-                </a:solidFill>
-                <a:latin typeface="Times"/>
-                <a:cs typeface="Times"/>
-              </a:rPr>
-              <a:t>p</a:t>
-            </a:r>
-            <a:r>
-              <a:rPr lang="en-US" sz="3600" b="0" dirty="0" smtClean="0">
-                <a:solidFill>
-                  <a:schemeClr val="tx1"/>
-                </a:solidFill>
-                <a:latin typeface="Times"/>
-                <a:cs typeface="Times"/>
-              </a:rPr>
-              <a:t> &lt; .05</a:t>
-            </a:r>
-          </a:p>
-          <a:p>
-            <a:pPr algn="ctr"/>
-            <a:r>
-              <a:rPr lang="en-US" sz="3600" u="sng" dirty="0" smtClean="0">
-                <a:solidFill>
-                  <a:schemeClr val="tx1"/>
-                </a:solidFill>
-                <a:latin typeface="Times"/>
-                <a:cs typeface="Times"/>
-              </a:rPr>
-              <a:t>Interactions with Age</a:t>
-            </a:r>
-          </a:p>
-          <a:p>
-            <a:r>
-              <a:rPr lang="en-US" sz="3600" b="0" dirty="0" smtClean="0">
-                <a:solidFill>
-                  <a:schemeClr val="tx1"/>
-                </a:solidFill>
-                <a:latin typeface="Times"/>
-                <a:cs typeface="Times"/>
-              </a:rPr>
-              <a:t>No significant interactions with age</a:t>
-            </a:r>
-            <a:endParaRPr lang="en-US" sz="3600" b="0" dirty="0">
+              <a:t>3,4</a:t>
+            </a:r>
+            <a:endParaRPr lang="en-US" sz="4800" b="0" dirty="0" smtClean="0">
               <a:solidFill>
                 <a:schemeClr val="tx1"/>
               </a:solidFill>
@@ -7770,7 +7436,41 @@
             </a:endParaRPr>
           </a:p>
           <a:p>
-            <a:endParaRPr lang="en-US" sz="3600" b="0" dirty="0" smtClean="0">
+            <a:pPr marL="685800" indent="-685800">
+              <a:buFont typeface="Wingdings" charset="2"/>
+              <a:buChar char="§"/>
+            </a:pPr>
+            <a:r>
+              <a:rPr lang="en-US" sz="4800" b="0" dirty="0" smtClean="0">
+                <a:solidFill>
+                  <a:schemeClr val="tx1"/>
+                </a:solidFill>
+                <a:latin typeface="Times"/>
+                <a:cs typeface="Times"/>
+              </a:rPr>
+              <a:t>Mispronunciation </a:t>
+            </a:r>
+            <a:r>
+              <a:rPr lang="en-US" sz="4800" b="0" dirty="0">
+                <a:solidFill>
+                  <a:schemeClr val="tx1"/>
+                </a:solidFill>
+                <a:latin typeface="Times"/>
+                <a:cs typeface="Times"/>
+              </a:rPr>
+              <a:t>sensitivity greater </a:t>
+            </a:r>
+            <a:r>
+              <a:rPr lang="en-US" sz="4800" b="0" dirty="0" smtClean="0">
+                <a:solidFill>
+                  <a:schemeClr val="tx1"/>
+                </a:solidFill>
+                <a:latin typeface="Times"/>
+                <a:cs typeface="Times"/>
+              </a:rPr>
+              <a:t>with unfamiliar  distractor; consistent as infants age</a:t>
+            </a:r>
+            <a:endParaRPr lang="en-US" sz="4800" b="0" dirty="0">
               <a:solidFill>
                 <a:schemeClr val="tx1"/>
               </a:solidFill>
@@ -7779,37 +7479,31 @@
             </a:endParaRPr>
           </a:p>
           <a:p>
-            <a:pPr marL="571500" indent="-571500">
-              <a:buFontTx/>
-              <a:buChar char="-"/>
+            <a:pPr marL="2678823" lvl="1" indent="-685800">
+              <a:buFont typeface="Wingdings" charset="2"/>
+              <a:buChar char="§"/>
             </a:pPr>
             <a:r>
-              <a:rPr lang="en-US" sz="3600" b="0" dirty="0" smtClean="0">
+              <a:rPr lang="en-US" sz="4800" b="0" dirty="0" smtClean="0">
                 <a:solidFill>
                   <a:schemeClr val="tx1"/>
                 </a:solidFill>
                 <a:latin typeface="Times"/>
                 <a:cs typeface="Times"/>
               </a:rPr>
-              <a:t>Mispronunciation sensitivity greater when the distractor is unfamiliar</a:t>
-            </a:r>
-          </a:p>
-          <a:p>
-            <a:pPr marL="571500" indent="-571500">
-              <a:buFontTx/>
-              <a:buChar char="-"/>
-            </a:pPr>
-            <a:r>
-              <a:rPr lang="en-US" sz="3600" b="0" dirty="0" smtClean="0">
+              <a:t>Unfamiliar object is a more viable option for mispronunciation than known familiar object</a:t>
+            </a:r>
+            <a:r>
+              <a:rPr lang="en-US" sz="4800" b="0" baseline="30000" dirty="0">
                 <a:solidFill>
                   <a:schemeClr val="tx1"/>
                 </a:solidFill>
                 <a:latin typeface="Times"/>
                 <a:cs typeface="Times"/>
               </a:rPr>
-              <a:t>Stays consistent as infants age</a:t>
-            </a:r>
-            <a:endParaRPr lang="en-US" sz="3600" b="0" dirty="0">
+              <a:t>5</a:t>
+            </a:r>
+            <a:endParaRPr lang="en-US" sz="4800" b="0" dirty="0">
               <a:solidFill>
                 <a:schemeClr val="tx1"/>
               </a:solidFill>
@@ -7817,65 +7511,26 @@
               <a:cs typeface="Times"/>
             </a:endParaRPr>
           </a:p>
-          <a:p>
-            <a:endParaRPr lang="en-US" sz="3600" b="0" dirty="0">
-              <a:solidFill>
-                <a:schemeClr val="tx1"/>
-              </a:solidFill>
-              <a:latin typeface="Times"/>
-              <a:cs typeface="Times"/>
-            </a:endParaRPr>
-          </a:p>
-          <a:p>
-            <a:pPr algn="ctr"/>
-            <a:r>
-              <a:rPr lang="en-US" sz="3600" b="0" i="1" dirty="0">
-                <a:solidFill>
-                  <a:schemeClr val="tx1"/>
-                </a:solidFill>
-                <a:latin typeface="Times"/>
-                <a:cs typeface="Times"/>
-              </a:rPr>
-              <a:t>*Focus on ages </a:t>
-            </a:r>
-            <a:r>
-              <a:rPr lang="en-US" sz="3600" b="0" i="1" dirty="0" smtClean="0">
-                <a:solidFill>
-                  <a:schemeClr val="tx1"/>
-                </a:solidFill>
-                <a:latin typeface="Times"/>
-                <a:cs typeface="Times"/>
-              </a:rPr>
-              <a:t>where familiar and unfamiliar distractors used*</a:t>
-            </a:r>
-            <a:endParaRPr lang="en-US" sz="3600" b="0" i="1" dirty="0">
-              <a:solidFill>
-                <a:schemeClr val="tx1"/>
-              </a:solidFill>
-              <a:latin typeface="Times"/>
-              <a:cs typeface="Times"/>
-            </a:endParaRPr>
-          </a:p>
         </p:txBody>
       </p:sp>
       <p:pic>
         <p:nvPicPr>
-          <p:cNvPr id="2049" name="Picture 2048"/>
+          <p:cNvPr id="8" name="Picture 7"/>
           <p:cNvPicPr>
             <a:picLocks noChangeAspect="1"/>
           </p:cNvPicPr>
           <p:nvPr/>
         </p:nvPicPr>
         <p:blipFill>
-          <a:blip r:embed="rId15"/>
+          <a:blip r:embed="rId10"/>
           <a:stretch>
             <a:fillRect/>
           </a:stretch>
         </p:blipFill>
         <p:spPr>
           <a:xfrm>
-            <a:off x="22050374" y="28674689"/>
-            <a:ext cx="7704856" cy="7203331"/>
+            <a:off x="111936" y="21977945"/>
+            <a:ext cx="13441494" cy="8064896"/>
           </a:xfrm>
           <a:prstGeom prst="rect">
             <a:avLst/>
@@ -7884,22 +7539,393 @@
       </p:pic>
       <p:pic>
         <p:nvPicPr>
-          <p:cNvPr id="2051" name="Picture 2050"/>
+          <p:cNvPr id="24" name="Picture 23"/>
           <p:cNvPicPr>
             <a:picLocks noChangeAspect="1"/>
           </p:cNvPicPr>
           <p:nvPr/>
         </p:nvPicPr>
         <p:blipFill>
-          <a:blip r:embed="rId16"/>
+          <a:blip r:embed="rId11"/>
           <a:stretch>
             <a:fillRect/>
           </a:stretch>
         </p:blipFill>
         <p:spPr>
           <a:xfrm>
-            <a:off x="13769454" y="18881601"/>
-            <a:ext cx="7704856" cy="6491614"/>
+            <a:off x="14345518" y="17225417"/>
+            <a:ext cx="7920880" cy="4752528"/>
+          </a:xfrm>
+          <a:prstGeom prst="rect">
+            <a:avLst/>
+          </a:prstGeom>
+        </p:spPr>
+      </p:pic>
+      <p:pic>
+        <p:nvPicPr>
+          <p:cNvPr id="25" name="Picture 24"/>
+          <p:cNvPicPr>
+            <a:picLocks noChangeAspect="1"/>
+          </p:cNvPicPr>
+          <p:nvPr/>
+        </p:nvPicPr>
+        <p:blipFill>
+          <a:blip r:embed="rId12"/>
+          <a:stretch>
+            <a:fillRect/>
+          </a:stretch>
+        </p:blipFill>
+        <p:spPr>
+          <a:xfrm>
+            <a:off x="21618326" y="24786257"/>
+            <a:ext cx="7920880" cy="4752528"/>
+          </a:xfrm>
+          <a:prstGeom prst="rect">
+            <a:avLst/>
+          </a:prstGeom>
+        </p:spPr>
+      </p:pic>
+      <p:sp>
+        <p:nvSpPr>
+          <p:cNvPr id="9" name="TextBox 8"/>
+          <p:cNvSpPr txBox="1"/>
+          <p:nvPr/>
+        </p:nvSpPr>
+        <p:spPr>
+          <a:xfrm>
+            <a:off x="22338407" y="17441441"/>
+            <a:ext cx="7632848" cy="3970318"/>
+          </a:xfrm>
+          <a:prstGeom prst="rect">
+            <a:avLst/>
+          </a:prstGeom>
+          <a:noFill/>
+        </p:spPr>
+        <p:txBody>
+          <a:bodyPr wrap="square" rtlCol="0">
+            <a:spAutoFit/>
+          </a:bodyPr>
+          <a:lstStyle/>
+          <a:p>
+            <a:pPr algn="ctr"/>
+            <a:r>
+              <a:rPr lang="en-US" sz="3600" u="sng" dirty="0">
+                <a:solidFill>
+                  <a:schemeClr val="tx1"/>
+                </a:solidFill>
+                <a:latin typeface="Times"/>
+                <a:cs typeface="Times"/>
+              </a:rPr>
+              <a:t>Features</a:t>
+            </a:r>
+          </a:p>
+          <a:p>
+            <a:r>
+              <a:rPr lang="en-US" sz="3600" b="0" dirty="0">
+                <a:solidFill>
+                  <a:schemeClr val="tx1"/>
+                </a:solidFill>
+                <a:latin typeface="Times"/>
+                <a:cs typeface="Times"/>
+              </a:rPr>
+              <a:t>Number: </a:t>
+            </a:r>
+            <a:r>
+              <a:rPr lang="en-US" sz="3600" b="0" i="1" dirty="0">
+                <a:solidFill>
+                  <a:schemeClr val="tx1"/>
+                </a:solidFill>
+                <a:latin typeface="Times"/>
+                <a:cs typeface="Times"/>
+              </a:rPr>
+              <a:t>g</a:t>
+            </a:r>
+            <a:r>
+              <a:rPr lang="en-US" sz="3600" b="0" dirty="0">
+                <a:solidFill>
+                  <a:schemeClr val="tx1"/>
+                </a:solidFill>
+                <a:latin typeface="Times"/>
+                <a:cs typeface="Times"/>
+              </a:rPr>
+              <a:t> = -0.31, SE = 0.03, </a:t>
+            </a:r>
+            <a:r>
+              <a:rPr lang="en-US" sz="3600" b="0" i="1" dirty="0">
+                <a:solidFill>
+                  <a:schemeClr val="tx1"/>
+                </a:solidFill>
+                <a:latin typeface="Times"/>
+                <a:cs typeface="Times"/>
+              </a:rPr>
+              <a:t>p</a:t>
+            </a:r>
+            <a:r>
+              <a:rPr lang="en-US" sz="3600" b="0" dirty="0">
+                <a:solidFill>
+                  <a:schemeClr val="tx1"/>
+                </a:solidFill>
+                <a:latin typeface="Times"/>
+                <a:cs typeface="Times"/>
+              </a:rPr>
+              <a:t> &lt; .0001</a:t>
+            </a:r>
+          </a:p>
+          <a:p>
+            <a:pPr algn="ctr"/>
+            <a:r>
+              <a:rPr lang="en-US" sz="3600" u="sng" dirty="0">
+                <a:solidFill>
+                  <a:schemeClr val="tx1"/>
+                </a:solidFill>
+                <a:latin typeface="Times"/>
+                <a:cs typeface="Times"/>
+              </a:rPr>
+              <a:t>Interactions with Age</a:t>
+            </a:r>
+          </a:p>
+          <a:p>
+            <a:r>
+              <a:rPr lang="en-US" sz="3600" b="0" dirty="0">
+                <a:solidFill>
+                  <a:schemeClr val="tx1"/>
+                </a:solidFill>
+                <a:latin typeface="Times"/>
+                <a:cs typeface="Times"/>
+              </a:rPr>
+              <a:t>No significant interactions with Age</a:t>
+            </a:r>
+            <a:endParaRPr lang="en-US" sz="3600" b="0" i="1" dirty="0">
+              <a:solidFill>
+                <a:schemeClr val="tx1"/>
+              </a:solidFill>
+              <a:latin typeface="Times"/>
+              <a:cs typeface="Times"/>
+            </a:endParaRPr>
+          </a:p>
+          <a:p>
+            <a:pPr marL="571500" indent="-571500">
+              <a:buFontTx/>
+              <a:buChar char="-"/>
+            </a:pPr>
+            <a:endParaRPr lang="en-US" sz="3600" b="0" dirty="0">
+              <a:solidFill>
+                <a:schemeClr val="tx1"/>
+              </a:solidFill>
+              <a:latin typeface="Times"/>
+              <a:cs typeface="Times"/>
+            </a:endParaRPr>
+          </a:p>
+          <a:p>
+            <a:pPr algn="ctr"/>
+            <a:r>
+              <a:rPr lang="en-US" sz="3600" b="0" i="1" dirty="0">
+                <a:solidFill>
+                  <a:schemeClr val="tx1"/>
+                </a:solidFill>
+                <a:latin typeface="Times"/>
+                <a:cs typeface="Times"/>
+              </a:rPr>
+              <a:t>*Focus on ages 18 to 30 months where feature is manipulated</a:t>
+            </a:r>
+            <a:r>
+              <a:rPr lang="en-US" sz="3600" b="0" i="1" dirty="0" smtClean="0">
+                <a:solidFill>
+                  <a:schemeClr val="tx1"/>
+                </a:solidFill>
+                <a:latin typeface="Times"/>
+                <a:cs typeface="Times"/>
+              </a:rPr>
+              <a:t>*</a:t>
+            </a:r>
+            <a:endParaRPr lang="en-US" sz="3600" b="0" i="1" dirty="0">
+              <a:solidFill>
+                <a:schemeClr val="tx1"/>
+              </a:solidFill>
+              <a:latin typeface="Times"/>
+              <a:cs typeface="Times"/>
+            </a:endParaRPr>
+          </a:p>
+        </p:txBody>
+      </p:sp>
+      <p:sp>
+        <p:nvSpPr>
+          <p:cNvPr id="11" name="TextBox 10"/>
+          <p:cNvSpPr txBox="1"/>
+          <p:nvPr/>
+        </p:nvSpPr>
+        <p:spPr>
+          <a:xfrm>
+            <a:off x="13985479" y="25064411"/>
+            <a:ext cx="7704856" cy="3970318"/>
+          </a:xfrm>
+          <a:prstGeom prst="rect">
+            <a:avLst/>
+          </a:prstGeom>
+          <a:noFill/>
+        </p:spPr>
+        <p:txBody>
+          <a:bodyPr wrap="square" rtlCol="0">
+            <a:spAutoFit/>
+          </a:bodyPr>
+          <a:lstStyle/>
+          <a:p>
+            <a:pPr algn="ctr"/>
+            <a:r>
+              <a:rPr lang="en-US" sz="3600" u="sng" dirty="0">
+                <a:solidFill>
+                  <a:schemeClr val="tx1"/>
+                </a:solidFill>
+                <a:latin typeface="Times"/>
+                <a:cs typeface="Times"/>
+              </a:rPr>
+              <a:t>Distractor Familiarity</a:t>
+            </a:r>
+          </a:p>
+          <a:p>
+            <a:r>
+              <a:rPr lang="en-US" sz="3600" b="0" dirty="0">
+                <a:solidFill>
+                  <a:schemeClr val="tx1"/>
+                </a:solidFill>
+                <a:latin typeface="Times"/>
+                <a:cs typeface="Times"/>
+              </a:rPr>
+              <a:t>Sensitivity: </a:t>
+            </a:r>
+            <a:r>
+              <a:rPr lang="en-US" sz="3600" b="0" i="1" dirty="0">
+                <a:solidFill>
+                  <a:schemeClr val="tx1"/>
+                </a:solidFill>
+                <a:latin typeface="Times"/>
+                <a:cs typeface="Times"/>
+              </a:rPr>
+              <a:t>g</a:t>
+            </a:r>
+            <a:r>
+              <a:rPr lang="en-US" sz="3600" b="0" dirty="0">
+                <a:solidFill>
+                  <a:schemeClr val="tx1"/>
+                </a:solidFill>
+                <a:latin typeface="Times"/>
+                <a:cs typeface="Times"/>
+              </a:rPr>
+              <a:t> = 0.19, SE = 0.09, </a:t>
+            </a:r>
+            <a:r>
+              <a:rPr lang="en-US" sz="3600" b="0" i="1" dirty="0">
+                <a:solidFill>
+                  <a:schemeClr val="tx1"/>
+                </a:solidFill>
+                <a:latin typeface="Times"/>
+                <a:cs typeface="Times"/>
+              </a:rPr>
+              <a:t>p</a:t>
+            </a:r>
+            <a:r>
+              <a:rPr lang="en-US" sz="3600" b="0" dirty="0">
+                <a:solidFill>
+                  <a:schemeClr val="tx1"/>
+                </a:solidFill>
+                <a:latin typeface="Times"/>
+                <a:cs typeface="Times"/>
+              </a:rPr>
+              <a:t> &lt; .05</a:t>
+            </a:r>
+          </a:p>
+          <a:p>
+            <a:pPr algn="ctr"/>
+            <a:r>
+              <a:rPr lang="en-US" sz="3600" u="sng" dirty="0">
+                <a:solidFill>
+                  <a:schemeClr val="tx1"/>
+                </a:solidFill>
+                <a:latin typeface="Times"/>
+                <a:cs typeface="Times"/>
+              </a:rPr>
+              <a:t>Interactions with Age</a:t>
+            </a:r>
+          </a:p>
+          <a:p>
+            <a:r>
+              <a:rPr lang="en-US" sz="3600" b="0" dirty="0">
+                <a:solidFill>
+                  <a:schemeClr val="tx1"/>
+                </a:solidFill>
+                <a:latin typeface="Times"/>
+                <a:cs typeface="Times"/>
+              </a:rPr>
+              <a:t>No significant interactions with age</a:t>
+            </a:r>
+          </a:p>
+          <a:p>
+            <a:endParaRPr lang="en-US" sz="3600" b="0" dirty="0">
+              <a:solidFill>
+                <a:schemeClr val="tx1"/>
+              </a:solidFill>
+              <a:latin typeface="Times"/>
+              <a:cs typeface="Times"/>
+            </a:endParaRPr>
+          </a:p>
+          <a:p>
+            <a:pPr algn="ctr"/>
+            <a:r>
+              <a:rPr lang="en-US" sz="3600" b="0" i="1" dirty="0">
+                <a:solidFill>
+                  <a:schemeClr val="tx1"/>
+                </a:solidFill>
+                <a:latin typeface="Times"/>
+                <a:cs typeface="Times"/>
+              </a:rPr>
+              <a:t>*Focus on ages 18 to 25 months where familiar &amp; unfamiliar distractors used</a:t>
+            </a:r>
+            <a:endParaRPr lang="en-US" sz="3600" dirty="0"/>
+          </a:p>
+        </p:txBody>
+      </p:sp>
+      <p:pic>
+        <p:nvPicPr>
+          <p:cNvPr id="13" name="Picture 12"/>
+          <p:cNvPicPr>
+            <a:picLocks noChangeAspect="1"/>
+          </p:cNvPicPr>
+          <p:nvPr/>
+        </p:nvPicPr>
+        <p:blipFill>
+          <a:blip r:embed="rId13"/>
+          <a:stretch>
+            <a:fillRect/>
+          </a:stretch>
+        </p:blipFill>
+        <p:spPr>
+          <a:xfrm>
+            <a:off x="519982" y="35731473"/>
+            <a:ext cx="9232950" cy="3247820"/>
+          </a:xfrm>
+          <a:prstGeom prst="rect">
+            <a:avLst/>
+          </a:prstGeom>
+        </p:spPr>
+      </p:pic>
+      <p:pic>
+        <p:nvPicPr>
+          <p:cNvPr id="17" name="Picture 16"/>
+          <p:cNvPicPr>
+            <a:picLocks noChangeAspect="1"/>
+          </p:cNvPicPr>
+          <p:nvPr/>
+        </p:nvPicPr>
+        <p:blipFill>
+          <a:blip r:embed="rId14"/>
+          <a:stretch>
+            <a:fillRect/>
+          </a:stretch>
+        </p:blipFill>
+        <p:spPr>
+          <a:xfrm>
+            <a:off x="26795120" y="1777795"/>
+            <a:ext cx="1951998" cy="2414173"/>
           </a:xfrm>
           <a:prstGeom prst="rect">
             <a:avLst/>

</xml_diff>

<commit_message>
fleshing out analyses for paper
</commit_message>
<xml_diff>
--- a/write-ups/ICIS 2018/Misp_MA_portrait.pptx
+++ b/write-ups/ICIS 2018/Misp_MA_portrait.pptx
@@ -142,7 +142,7 @@
   </p:defaultTextStyle>
   <p:extLst>
     <p:ext uri="{EFAFB233-063F-42B5-8137-9DF3F51BA10A}">
-      <p15:sldGuideLst xmlns="" xmlns:p15="http://schemas.microsoft.com/office/powerpoint/2012/main">
+      <p15:sldGuideLst xmlns:p15="http://schemas.microsoft.com/office/powerpoint/2012/main">
         <p15:guide id="1" orient="horz" pos="5141">
           <p15:clr>
             <a:srgbClr val="A4A3A4"/>
@@ -156,7 +156,7 @@
       </p15:sldGuideLst>
     </p:ext>
     <p:ext uri="{2D200454-40CA-4A62-9FC3-DE9A4176ACB9}">
-      <p15:notesGuideLst xmlns="" xmlns:p15="http://schemas.microsoft.com/office/powerpoint/2012/main">
+      <p15:notesGuideLst xmlns:p15="http://schemas.microsoft.com/office/powerpoint/2012/main">
         <p15:guide id="1" orient="horz" pos="13122">
           <p15:clr>
             <a:srgbClr val="A4A3A4"/>
@@ -583,35 +583,35 @@
           <a:p>
             <a:pPr lvl="0"/>
             <a:r>
-              <a:rPr lang="en-GB" noProof="0" smtClean="0"/>
+              <a:rPr lang="en-GB" noProof="0"/>
               <a:t>Klik om de opmaakprofielen van de modeltekst te bewerken</a:t>
             </a:r>
           </a:p>
           <a:p>
             <a:pPr lvl="1"/>
             <a:r>
-              <a:rPr lang="en-GB" noProof="0" smtClean="0"/>
+              <a:rPr lang="en-GB" noProof="0"/>
               <a:t>Tweede niveau</a:t>
             </a:r>
           </a:p>
           <a:p>
             <a:pPr lvl="2"/>
             <a:r>
-              <a:rPr lang="en-GB" noProof="0" smtClean="0"/>
+              <a:rPr lang="en-GB" noProof="0"/>
               <a:t>Derde niveau</a:t>
             </a:r>
           </a:p>
           <a:p>
             <a:pPr lvl="3"/>
             <a:r>
-              <a:rPr lang="en-GB" noProof="0" smtClean="0"/>
+              <a:rPr lang="en-GB" noProof="0"/>
               <a:t>Vierde niveau</a:t>
             </a:r>
           </a:p>
           <a:p>
             <a:pPr lvl="4"/>
             <a:r>
-              <a:rPr lang="en-GB" noProof="0" smtClean="0"/>
+              <a:rPr lang="en-GB" noProof="0"/>
               <a:t>Vijfde niveau</a:t>
             </a:r>
           </a:p>
@@ -888,7 +888,7 @@
               <a:pPr/>
               <a:t>1</a:t>
             </a:fld>
-            <a:endParaRPr lang="en-GB" smtClean="0"/>
+            <a:endParaRPr lang="en-GB"/>
           </a:p>
         </p:txBody>
       </p:sp>
@@ -932,7 +932,7 @@
               <a:buFont typeface="Arial" pitchFamily="34" charset="0"/>
               <a:buChar char="•"/>
             </a:pPr>
-            <a:endParaRPr lang="de-DE" sz="14700" dirty="0" smtClean="0">
+            <a:endParaRPr lang="de-DE" sz="14700" dirty="0">
               <a:solidFill>
                 <a:srgbClr val="003399"/>
               </a:solidFill>
@@ -991,10 +991,9 @@
           <a:lstStyle/>
           <a:p>
             <a:r>
-              <a:rPr lang="en-US" smtClean="0"/>
+              <a:rPr lang="en-US"/>
               <a:t>Click to edit Master title style</a:t>
             </a:r>
-            <a:endParaRPr lang="en-US"/>
           </a:p>
         </p:txBody>
       </p:sp>
@@ -1110,10 +1109,9 @@
           </a:lstStyle>
           <a:p>
             <a:r>
-              <a:rPr lang="en-US" smtClean="0"/>
+              <a:rPr lang="en-US"/>
               <a:t>Click to edit Master subtitle style</a:t>
             </a:r>
-            <a:endParaRPr lang="en-US"/>
           </a:p>
         </p:txBody>
       </p:sp>
@@ -1243,10 +1241,9 @@
           <a:lstStyle/>
           <a:p>
             <a:r>
-              <a:rPr lang="en-US" smtClean="0"/>
+              <a:rPr lang="en-US"/>
               <a:t>Click to edit Master title style</a:t>
             </a:r>
-            <a:endParaRPr lang="en-US"/>
           </a:p>
         </p:txBody>
       </p:sp>
@@ -1267,38 +1264,37 @@
           <a:p>
             <a:pPr lvl="0"/>
             <a:r>
-              <a:rPr lang="en-US" smtClean="0"/>
+              <a:rPr lang="en-US"/>
               <a:t>Click to edit Master text styles</a:t>
             </a:r>
           </a:p>
           <a:p>
             <a:pPr lvl="1"/>
             <a:r>
-              <a:rPr lang="en-US" smtClean="0"/>
+              <a:rPr lang="en-US"/>
               <a:t>Second level</a:t>
             </a:r>
           </a:p>
           <a:p>
             <a:pPr lvl="2"/>
             <a:r>
-              <a:rPr lang="en-US" smtClean="0"/>
+              <a:rPr lang="en-US"/>
               <a:t>Third level</a:t>
             </a:r>
           </a:p>
           <a:p>
             <a:pPr lvl="3"/>
             <a:r>
-              <a:rPr lang="en-US" smtClean="0"/>
+              <a:rPr lang="en-US"/>
               <a:t>Fourth level</a:t>
             </a:r>
           </a:p>
           <a:p>
             <a:pPr lvl="4"/>
             <a:r>
-              <a:rPr lang="en-US" smtClean="0"/>
+              <a:rPr lang="en-US"/>
               <a:t>Fifth level</a:t>
             </a:r>
-            <a:endParaRPr lang="en-US"/>
           </a:p>
         </p:txBody>
       </p:sp>
@@ -1433,10 +1429,9 @@
           <a:lstStyle/>
           <a:p>
             <a:r>
-              <a:rPr lang="en-US" smtClean="0"/>
+              <a:rPr lang="en-US"/>
               <a:t>Click to edit Master title style</a:t>
             </a:r>
-            <a:endParaRPr lang="en-US"/>
           </a:p>
         </p:txBody>
       </p:sp>
@@ -1462,38 +1457,37 @@
           <a:p>
             <a:pPr lvl="0"/>
             <a:r>
-              <a:rPr lang="en-US" smtClean="0"/>
+              <a:rPr lang="en-US"/>
               <a:t>Click to edit Master text styles</a:t>
             </a:r>
           </a:p>
           <a:p>
             <a:pPr lvl="1"/>
             <a:r>
-              <a:rPr lang="en-US" smtClean="0"/>
+              <a:rPr lang="en-US"/>
               <a:t>Second level</a:t>
             </a:r>
           </a:p>
           <a:p>
             <a:pPr lvl="2"/>
             <a:r>
-              <a:rPr lang="en-US" smtClean="0"/>
+              <a:rPr lang="en-US"/>
               <a:t>Third level</a:t>
             </a:r>
           </a:p>
           <a:p>
             <a:pPr lvl="3"/>
             <a:r>
-              <a:rPr lang="en-US" smtClean="0"/>
+              <a:rPr lang="en-US"/>
               <a:t>Fourth level</a:t>
             </a:r>
           </a:p>
           <a:p>
             <a:pPr lvl="4"/>
             <a:r>
-              <a:rPr lang="en-US" smtClean="0"/>
+              <a:rPr lang="en-US"/>
               <a:t>Fifth level</a:t>
             </a:r>
-            <a:endParaRPr lang="en-US"/>
           </a:p>
         </p:txBody>
       </p:sp>
@@ -1623,10 +1617,9 @@
           <a:lstStyle/>
           <a:p>
             <a:r>
-              <a:rPr lang="en-US" smtClean="0"/>
+              <a:rPr lang="en-US"/>
               <a:t>Click to edit Master title style</a:t>
             </a:r>
-            <a:endParaRPr lang="en-US"/>
           </a:p>
         </p:txBody>
       </p:sp>
@@ -1647,38 +1640,37 @@
           <a:p>
             <a:pPr lvl="0"/>
             <a:r>
-              <a:rPr lang="en-US" smtClean="0"/>
+              <a:rPr lang="en-US"/>
               <a:t>Click to edit Master text styles</a:t>
             </a:r>
           </a:p>
           <a:p>
             <a:pPr lvl="1"/>
             <a:r>
-              <a:rPr lang="en-US" smtClean="0"/>
+              <a:rPr lang="en-US"/>
               <a:t>Second level</a:t>
             </a:r>
           </a:p>
           <a:p>
             <a:pPr lvl="2"/>
             <a:r>
-              <a:rPr lang="en-US" smtClean="0"/>
+              <a:rPr lang="en-US"/>
               <a:t>Third level</a:t>
             </a:r>
           </a:p>
           <a:p>
             <a:pPr lvl="3"/>
             <a:r>
-              <a:rPr lang="en-US" smtClean="0"/>
+              <a:rPr lang="en-US"/>
               <a:t>Fourth level</a:t>
             </a:r>
           </a:p>
           <a:p>
             <a:pPr lvl="4"/>
             <a:r>
-              <a:rPr lang="en-US" smtClean="0"/>
+              <a:rPr lang="en-US"/>
               <a:t>Fifth level</a:t>
             </a:r>
-            <a:endParaRPr lang="en-US"/>
           </a:p>
         </p:txBody>
       </p:sp>
@@ -1817,10 +1809,9 @@
           </a:lstStyle>
           <a:p>
             <a:r>
-              <a:rPr lang="en-US" smtClean="0"/>
+              <a:rPr lang="en-US"/>
               <a:t>Click to edit Master title style</a:t>
             </a:r>
-            <a:endParaRPr lang="en-US"/>
           </a:p>
         </p:txBody>
       </p:sp>
@@ -1937,7 +1928,7 @@
           <a:p>
             <a:pPr lvl="0"/>
             <a:r>
-              <a:rPr lang="en-US" smtClean="0"/>
+              <a:rPr lang="en-US"/>
               <a:t>Click to edit Master text styles</a:t>
             </a:r>
           </a:p>
@@ -2069,10 +2060,9 @@
           <a:lstStyle/>
           <a:p>
             <a:r>
-              <a:rPr lang="en-US" smtClean="0"/>
+              <a:rPr lang="en-US"/>
               <a:t>Click to edit Master title style</a:t>
             </a:r>
-            <a:endParaRPr lang="en-US"/>
           </a:p>
         </p:txBody>
       </p:sp>
@@ -2126,38 +2116,37 @@
           <a:p>
             <a:pPr lvl="0"/>
             <a:r>
-              <a:rPr lang="en-US" smtClean="0"/>
+              <a:rPr lang="en-US"/>
               <a:t>Click to edit Master text styles</a:t>
             </a:r>
           </a:p>
           <a:p>
             <a:pPr lvl="1"/>
             <a:r>
-              <a:rPr lang="en-US" smtClean="0"/>
+              <a:rPr lang="en-US"/>
               <a:t>Second level</a:t>
             </a:r>
           </a:p>
           <a:p>
             <a:pPr lvl="2"/>
             <a:r>
-              <a:rPr lang="en-US" smtClean="0"/>
+              <a:rPr lang="en-US"/>
               <a:t>Third level</a:t>
             </a:r>
           </a:p>
           <a:p>
             <a:pPr lvl="3"/>
             <a:r>
-              <a:rPr lang="en-US" smtClean="0"/>
+              <a:rPr lang="en-US"/>
               <a:t>Fourth level</a:t>
             </a:r>
           </a:p>
           <a:p>
             <a:pPr lvl="4"/>
             <a:r>
-              <a:rPr lang="en-US" smtClean="0"/>
+              <a:rPr lang="en-US"/>
               <a:t>Fifth level</a:t>
             </a:r>
-            <a:endParaRPr lang="en-US"/>
           </a:p>
         </p:txBody>
       </p:sp>
@@ -2211,38 +2200,37 @@
           <a:p>
             <a:pPr lvl="0"/>
             <a:r>
-              <a:rPr lang="en-US" smtClean="0"/>
+              <a:rPr lang="en-US"/>
               <a:t>Click to edit Master text styles</a:t>
             </a:r>
           </a:p>
           <a:p>
             <a:pPr lvl="1"/>
             <a:r>
-              <a:rPr lang="en-US" smtClean="0"/>
+              <a:rPr lang="en-US"/>
               <a:t>Second level</a:t>
             </a:r>
           </a:p>
           <a:p>
             <a:pPr lvl="2"/>
             <a:r>
-              <a:rPr lang="en-US" smtClean="0"/>
+              <a:rPr lang="en-US"/>
               <a:t>Third level</a:t>
             </a:r>
           </a:p>
           <a:p>
             <a:pPr lvl="3"/>
             <a:r>
-              <a:rPr lang="en-US" smtClean="0"/>
+              <a:rPr lang="en-US"/>
               <a:t>Fourth level</a:t>
             </a:r>
           </a:p>
           <a:p>
             <a:pPr lvl="4"/>
             <a:r>
-              <a:rPr lang="en-US" smtClean="0"/>
+              <a:rPr lang="en-US"/>
               <a:t>Fifth level</a:t>
             </a:r>
-            <a:endParaRPr lang="en-US"/>
           </a:p>
         </p:txBody>
       </p:sp>
@@ -2381,10 +2369,9 @@
           </a:lstStyle>
           <a:p>
             <a:r>
-              <a:rPr lang="en-US" smtClean="0"/>
+              <a:rPr lang="en-US"/>
               <a:t>Click to edit Master title style</a:t>
             </a:r>
-            <a:endParaRPr lang="en-US"/>
           </a:p>
         </p:txBody>
       </p:sp>
@@ -2447,7 +2434,7 @@
           <a:p>
             <a:pPr lvl="0"/>
             <a:r>
-              <a:rPr lang="en-US" smtClean="0"/>
+              <a:rPr lang="en-US"/>
               <a:t>Click to edit Master text styles</a:t>
             </a:r>
           </a:p>
@@ -2503,38 +2490,37 @@
           <a:p>
             <a:pPr lvl="0"/>
             <a:r>
-              <a:rPr lang="en-US" smtClean="0"/>
+              <a:rPr lang="en-US"/>
               <a:t>Click to edit Master text styles</a:t>
             </a:r>
           </a:p>
           <a:p>
             <a:pPr lvl="1"/>
             <a:r>
-              <a:rPr lang="en-US" smtClean="0"/>
+              <a:rPr lang="en-US"/>
               <a:t>Second level</a:t>
             </a:r>
           </a:p>
           <a:p>
             <a:pPr lvl="2"/>
             <a:r>
-              <a:rPr lang="en-US" smtClean="0"/>
+              <a:rPr lang="en-US"/>
               <a:t>Third level</a:t>
             </a:r>
           </a:p>
           <a:p>
             <a:pPr lvl="3"/>
             <a:r>
-              <a:rPr lang="en-US" smtClean="0"/>
+              <a:rPr lang="en-US"/>
               <a:t>Fourth level</a:t>
             </a:r>
           </a:p>
           <a:p>
             <a:pPr lvl="4"/>
             <a:r>
-              <a:rPr lang="en-US" smtClean="0"/>
+              <a:rPr lang="en-US"/>
               <a:t>Fifth level</a:t>
             </a:r>
-            <a:endParaRPr lang="en-US"/>
           </a:p>
         </p:txBody>
       </p:sp>
@@ -2597,7 +2583,7 @@
           <a:p>
             <a:pPr lvl="0"/>
             <a:r>
-              <a:rPr lang="en-US" smtClean="0"/>
+              <a:rPr lang="en-US"/>
               <a:t>Click to edit Master text styles</a:t>
             </a:r>
           </a:p>
@@ -2653,38 +2639,37 @@
           <a:p>
             <a:pPr lvl="0"/>
             <a:r>
-              <a:rPr lang="en-US" smtClean="0"/>
+              <a:rPr lang="en-US"/>
               <a:t>Click to edit Master text styles</a:t>
             </a:r>
           </a:p>
           <a:p>
             <a:pPr lvl="1"/>
             <a:r>
-              <a:rPr lang="en-US" smtClean="0"/>
+              <a:rPr lang="en-US"/>
               <a:t>Second level</a:t>
             </a:r>
           </a:p>
           <a:p>
             <a:pPr lvl="2"/>
             <a:r>
-              <a:rPr lang="en-US" smtClean="0"/>
+              <a:rPr lang="en-US"/>
               <a:t>Third level</a:t>
             </a:r>
           </a:p>
           <a:p>
             <a:pPr lvl="3"/>
             <a:r>
-              <a:rPr lang="en-US" smtClean="0"/>
+              <a:rPr lang="en-US"/>
               <a:t>Fourth level</a:t>
             </a:r>
           </a:p>
           <a:p>
             <a:pPr lvl="4"/>
             <a:r>
-              <a:rPr lang="en-US" smtClean="0"/>
+              <a:rPr lang="en-US"/>
               <a:t>Fifth level</a:t>
             </a:r>
-            <a:endParaRPr lang="en-US"/>
           </a:p>
         </p:txBody>
       </p:sp>
@@ -2814,10 +2799,9 @@
           <a:lstStyle/>
           <a:p>
             <a:r>
-              <a:rPr lang="en-US" smtClean="0"/>
+              <a:rPr lang="en-US"/>
               <a:t>Click to edit Master title style</a:t>
             </a:r>
-            <a:endParaRPr lang="en-US"/>
           </a:p>
         </p:txBody>
       </p:sp>
@@ -3066,10 +3050,9 @@
           </a:lstStyle>
           <a:p>
             <a:r>
-              <a:rPr lang="en-US" smtClean="0"/>
+              <a:rPr lang="en-US"/>
               <a:t>Click to edit Master title style</a:t>
             </a:r>
-            <a:endParaRPr lang="en-US"/>
           </a:p>
         </p:txBody>
       </p:sp>
@@ -3123,38 +3106,37 @@
           <a:p>
             <a:pPr lvl="0"/>
             <a:r>
-              <a:rPr lang="en-US" smtClean="0"/>
+              <a:rPr lang="en-US"/>
               <a:t>Click to edit Master text styles</a:t>
             </a:r>
           </a:p>
           <a:p>
             <a:pPr lvl="1"/>
             <a:r>
-              <a:rPr lang="en-US" smtClean="0"/>
+              <a:rPr lang="en-US"/>
               <a:t>Second level</a:t>
             </a:r>
           </a:p>
           <a:p>
             <a:pPr lvl="2"/>
             <a:r>
-              <a:rPr lang="en-US" smtClean="0"/>
+              <a:rPr lang="en-US"/>
               <a:t>Third level</a:t>
             </a:r>
           </a:p>
           <a:p>
             <a:pPr lvl="3"/>
             <a:r>
-              <a:rPr lang="en-US" smtClean="0"/>
+              <a:rPr lang="en-US"/>
               <a:t>Fourth level</a:t>
             </a:r>
           </a:p>
           <a:p>
             <a:pPr lvl="4"/>
             <a:r>
-              <a:rPr lang="en-US" smtClean="0"/>
+              <a:rPr lang="en-US"/>
               <a:t>Fifth level</a:t>
             </a:r>
-            <a:endParaRPr lang="en-US"/>
           </a:p>
         </p:txBody>
       </p:sp>
@@ -3217,7 +3199,7 @@
           <a:p>
             <a:pPr lvl="0"/>
             <a:r>
-              <a:rPr lang="en-US" smtClean="0"/>
+              <a:rPr lang="en-US"/>
               <a:t>Click to edit Master text styles</a:t>
             </a:r>
           </a:p>
@@ -3358,10 +3340,9 @@
           </a:lstStyle>
           <a:p>
             <a:r>
-              <a:rPr lang="en-US" smtClean="0"/>
+              <a:rPr lang="en-US"/>
               <a:t>Click to edit Master title style</a:t>
             </a:r>
-            <a:endParaRPr lang="en-US"/>
           </a:p>
         </p:txBody>
       </p:sp>
@@ -3425,7 +3406,7 @@
           </a:lstStyle>
           <a:p>
             <a:pPr lvl="0"/>
-            <a:endParaRPr lang="en-US" noProof="0" smtClean="0"/>
+            <a:endParaRPr lang="en-US" noProof="0"/>
           </a:p>
         </p:txBody>
       </p:sp>
@@ -3488,7 +3469,7 @@
           <a:p>
             <a:pPr lvl="0"/>
             <a:r>
-              <a:rPr lang="en-US" smtClean="0"/>
+              <a:rPr lang="en-US"/>
               <a:t>Click to edit Master text styles</a:t>
             </a:r>
           </a:p>
@@ -3645,7 +3626,7 @@
           <a:p>
             <a:pPr lvl="0"/>
             <a:r>
-              <a:rPr lang="en-US" smtClean="0"/>
+              <a:rPr lang="en-US"/>
               <a:t>Click to edit Master title style</a:t>
             </a:r>
           </a:p>
@@ -3687,35 +3668,35 @@
           <a:p>
             <a:pPr lvl="0"/>
             <a:r>
-              <a:rPr lang="en-US" smtClean="0"/>
+              <a:rPr lang="en-US"/>
               <a:t>Click to edit Master text styles</a:t>
             </a:r>
           </a:p>
           <a:p>
             <a:pPr lvl="1"/>
             <a:r>
-              <a:rPr lang="en-US" smtClean="0"/>
+              <a:rPr lang="en-US"/>
               <a:t>Second level</a:t>
             </a:r>
           </a:p>
           <a:p>
             <a:pPr lvl="2"/>
             <a:r>
-              <a:rPr lang="en-US" smtClean="0"/>
+              <a:rPr lang="en-US"/>
               <a:t>Third level</a:t>
             </a:r>
           </a:p>
           <a:p>
             <a:pPr lvl="3"/>
             <a:r>
-              <a:rPr lang="en-US" smtClean="0"/>
+              <a:rPr lang="en-US"/>
               <a:t>Fourth level</a:t>
             </a:r>
           </a:p>
           <a:p>
             <a:pPr lvl="4"/>
             <a:r>
-              <a:rPr lang="en-US" smtClean="0"/>
+              <a:rPr lang="en-US"/>
               <a:t>Fifth level</a:t>
             </a:r>
           </a:p>
@@ -4319,7 +4300,7 @@
           <a:lstStyle/>
           <a:p>
             <a:pPr algn="ctr"/>
-            <a:endParaRPr lang="en-US" sz="4800" u="sng" dirty="0" smtClean="0">
+            <a:endParaRPr lang="en-US" sz="4800" u="sng" dirty="0">
               <a:solidFill>
                 <a:schemeClr val="tx1"/>
               </a:solidFill>
@@ -4329,7 +4310,7 @@
           </a:p>
           <a:p>
             <a:pPr algn="ctr"/>
-            <a:endParaRPr lang="en-US" sz="4800" u="sng" dirty="0" smtClean="0">
+            <a:endParaRPr lang="en-US" sz="4800" u="sng" dirty="0">
               <a:solidFill>
                 <a:schemeClr val="tx1"/>
               </a:solidFill>
@@ -4340,7 +4321,7 @@
           <a:p>
             <a:pPr algn="ctr"/>
             <a:r>
-              <a:rPr lang="en-US" sz="4800" u="sng" dirty="0" smtClean="0">
+              <a:rPr lang="en-US" sz="4800" u="sng" dirty="0">
                 <a:solidFill>
                   <a:schemeClr val="tx1"/>
                 </a:solidFill>
@@ -4353,34 +4334,14 @@
           <a:p>
             <a:pPr algn="ctr"/>
             <a:r>
-              <a:rPr lang="en-US" sz="4800" b="0" dirty="0" smtClean="0">
+              <a:rPr lang="en-US" sz="4800" b="0" dirty="0">
                 <a:solidFill>
                   <a:schemeClr val="tx1"/>
                 </a:solidFill>
                 <a:latin typeface="Times"/>
                 <a:cs typeface="Times"/>
               </a:rPr>
-              <a:t>Infants</a:t>
-            </a:r>
-            <a:r>
-              <a:rPr lang="en-US" sz="4800" b="0" dirty="0">
-                <a:solidFill>
-                  <a:schemeClr val="tx1"/>
-                </a:solidFill>
-                <a:latin typeface="Times"/>
-                <a:cs typeface="Times"/>
-              </a:rPr>
-              <a:t>’ sensitivity to changes in the phonological form of familiar </a:t>
-            </a:r>
-            <a:r>
-              <a:rPr lang="en-US" sz="4800" b="0" dirty="0" smtClean="0">
-                <a:solidFill>
-                  <a:schemeClr val="tx1"/>
-                </a:solidFill>
-                <a:latin typeface="Times"/>
-                <a:cs typeface="Times"/>
-              </a:rPr>
-              <a:t>words</a:t>
+              <a:t>Infants’ sensitivity to changes in the phonological form of familiar words</a:t>
             </a:r>
           </a:p>
           <a:p>
@@ -4401,7 +4362,7 @@
               <a:buFontTx/>
               <a:buChar char="-"/>
             </a:pPr>
-            <a:endParaRPr lang="en-US" sz="6000" b="0" dirty="0" smtClean="0">
+            <a:endParaRPr lang="en-US" sz="6000" b="0" dirty="0">
               <a:solidFill>
                 <a:schemeClr val="tx1"/>
               </a:solidFill>
@@ -4427,15 +4388,6 @@
               <a:buFontTx/>
               <a:buChar char="-"/>
             </a:pPr>
-            <a:endParaRPr lang="en-US" sz="6000" b="0" dirty="0" smtClean="0">
-              <a:solidFill>
-                <a:schemeClr val="tx1"/>
-              </a:solidFill>
-              <a:latin typeface="Times"/>
-              <a:cs typeface="Times"/>
-            </a:endParaRPr>
-          </a:p>
-          <a:p>
             <a:endParaRPr lang="en-US" sz="6000" b="0" dirty="0">
               <a:solidFill>
                 <a:schemeClr val="tx1"/>
@@ -4454,7 +4406,7 @@
             </a:endParaRPr>
           </a:p>
           <a:p>
-            <a:endParaRPr lang="en-US" sz="6000" b="0" dirty="0" smtClean="0">
+            <a:endParaRPr lang="en-US" sz="6000" b="0" dirty="0">
               <a:solidFill>
                 <a:schemeClr val="tx1"/>
               </a:solidFill>
@@ -4463,7 +4415,16 @@
             </a:endParaRPr>
           </a:p>
           <a:p>
-            <a:endParaRPr lang="en-US" sz="6000" b="0" dirty="0" smtClean="0">
+            <a:endParaRPr lang="en-US" sz="6000" b="0" dirty="0">
+              <a:solidFill>
+                <a:schemeClr val="tx1"/>
+              </a:solidFill>
+              <a:latin typeface="Times"/>
+              <a:cs typeface="Times"/>
+            </a:endParaRPr>
+          </a:p>
+          <a:p>
+            <a:endParaRPr lang="en-US" sz="6000" b="0" dirty="0">
               <a:solidFill>
                 <a:schemeClr val="tx1"/>
               </a:solidFill>
@@ -4550,34 +4511,34 @@
           <a:p>
             <a:pPr algn="ctr"/>
             <a:r>
-              <a:rPr lang="de-DE" sz="6400" i="1" dirty="0" smtClean="0">
+              <a:rPr lang="de-DE" sz="6400" i="1" dirty="0">
                 <a:latin typeface="Times"/>
                 <a:cs typeface="Times"/>
               </a:rPr>
               <a:t>Katie Von Holzen</a:t>
             </a:r>
             <a:r>
-              <a:rPr lang="de-DE" sz="6400" i="1" baseline="30000" dirty="0" smtClean="0">
+              <a:rPr lang="de-DE" sz="6400" i="1" baseline="30000" dirty="0">
                 <a:latin typeface="Times"/>
                 <a:cs typeface="Times"/>
               </a:rPr>
               <a:t>1,2</a:t>
             </a:r>
             <a:r>
-              <a:rPr lang="de-DE" sz="6400" i="1" dirty="0" smtClean="0">
+              <a:rPr lang="de-DE" sz="6400" i="1" dirty="0">
                 <a:latin typeface="Times"/>
                 <a:cs typeface="Times"/>
               </a:rPr>
               <a:t> &amp; Christina Bergmann</a:t>
             </a:r>
             <a:r>
-              <a:rPr lang="de-DE" sz="6400" i="1" baseline="30000" dirty="0" smtClean="0">
+              <a:rPr lang="de-DE" sz="6400" i="1" baseline="30000" dirty="0">
                 <a:latin typeface="Times"/>
                 <a:cs typeface="Times"/>
               </a:rPr>
               <a:t>3,4</a:t>
             </a:r>
-            <a:endParaRPr lang="de-DE" sz="6400" i="1" dirty="0" smtClean="0">
+            <a:endParaRPr lang="de-DE" sz="6400" i="1" dirty="0">
               <a:latin typeface="Times"/>
               <a:cs typeface="Times"/>
             </a:endParaRPr>
@@ -4608,7 +4569,7 @@
           <a:p>
             <a:pPr algn="ctr"/>
             <a:r>
-              <a:rPr lang="en-US" sz="9400" dirty="0" smtClean="0">
+              <a:rPr lang="en-US" sz="9400" dirty="0">
                 <a:latin typeface="Times"/>
                 <a:cs typeface="Times"/>
               </a:rPr>
@@ -4645,7 +4606,7 @@
           <a:p>
             <a:pPr algn="ctr" defTabSz="608849"/>
             <a:r>
-              <a:rPr lang="en-GB" sz="4800" dirty="0" smtClean="0">
+              <a:rPr lang="en-GB" sz="4800" dirty="0">
                 <a:latin typeface="Times"/>
                 <a:cs typeface="Times"/>
               </a:rPr>
@@ -4658,13 +4619,7 @@
               <a:rPr lang="en-GB" sz="4800" dirty="0">
                 <a:latin typeface="+mn-lt"/>
               </a:rPr>
-              <a:t>2</a:t>
-            </a:r>
-            <a:r>
-              <a:rPr lang="en-GB" sz="4800" dirty="0" smtClean="0">
-                <a:latin typeface="+mn-lt"/>
-              </a:rPr>
-              <a:t>. </a:t>
+              <a:t>2. </a:t>
             </a:r>
             <a:r>
               <a:rPr lang="en-US" sz="4800" dirty="0" err="1"/>
@@ -4672,11 +4627,7 @@
             </a:r>
             <a:r>
               <a:rPr lang="en-US" sz="4800" dirty="0"/>
-              <a:t> Paris Rene </a:t>
-            </a:r>
-            <a:r>
-              <a:rPr lang="en-US" sz="4800" dirty="0" smtClean="0"/>
-              <a:t>Descartes, </a:t>
+              <a:t> Paris Rene Descartes, </a:t>
             </a:r>
             <a:r>
               <a:rPr lang="en-US" sz="4800" dirty="0" err="1"/>
@@ -4692,34 +4643,21 @@
             </a:r>
             <a:r>
               <a:rPr lang="en-US" sz="4800" dirty="0"/>
-              <a:t> de la Perception CNRS, </a:t>
-            </a:r>
-            <a:r>
-              <a:rPr lang="en-US" sz="4800" dirty="0" smtClean="0"/>
-              <a:t>France</a:t>
+              <a:t> de la Perception CNRS, France</a:t>
             </a:r>
           </a:p>
           <a:p>
             <a:pPr algn="ctr" defTabSz="608849"/>
             <a:r>
-              <a:rPr lang="en-US" sz="4800" dirty="0" smtClean="0"/>
+              <a:rPr lang="en-US" sz="4800" dirty="0"/>
               <a:t>3. Max Planck Institute for Psycholinguistics, The Netherlands</a:t>
             </a:r>
-            <a:endParaRPr lang="en-US" sz="4800" dirty="0"/>
           </a:p>
           <a:p>
             <a:pPr marL="915154" indent="-915154" algn="ctr"/>
             <a:r>
               <a:rPr lang="en-GB" sz="4800" dirty="0"/>
-              <a:t>4</a:t>
-            </a:r>
-            <a:r>
-              <a:rPr lang="en-GB" sz="4800" dirty="0" smtClean="0"/>
-              <a:t>.  </a:t>
-            </a:r>
-            <a:r>
-              <a:rPr lang="en-GB" sz="4800" dirty="0"/>
-              <a:t>LSCP, </a:t>
+              <a:t>4.  LSCP, </a:t>
             </a:r>
             <a:r>
               <a:rPr lang="en-US" sz="4800" dirty="0" err="1"/>
@@ -4866,7 +4804,7 @@
           <a:p>
             <a:pPr algn="ctr"/>
             <a:r>
-              <a:rPr lang="en-US" sz="4800" u="sng" dirty="0" smtClean="0">
+              <a:rPr lang="en-US" sz="4800" u="sng" dirty="0">
                 <a:solidFill>
                   <a:schemeClr val="tx1"/>
                 </a:solidFill>
@@ -4885,7 +4823,7 @@
               <a:buAutoNum type="arabicParenR"/>
             </a:pPr>
             <a:r>
-              <a:rPr lang="en-US" sz="4800" b="0" dirty="0" smtClean="0">
+              <a:rPr lang="en-US" sz="4800" b="0" dirty="0">
                 <a:solidFill>
                   <a:schemeClr val="tx1"/>
                 </a:solidFill>
@@ -4895,7 +4833,7 @@
               <a:t>More sensitive with development</a:t>
             </a:r>
             <a:r>
-              <a:rPr lang="en-US" sz="4800" b="0" baseline="30000" dirty="0" smtClean="0">
+              <a:rPr lang="en-US" sz="4800" b="0" baseline="30000" dirty="0">
                 <a:solidFill>
                   <a:schemeClr val="tx1"/>
                 </a:solidFill>
@@ -4904,7 +4842,7 @@
               </a:rPr>
               <a:t>1</a:t>
             </a:r>
-            <a:endParaRPr lang="en-US" sz="4800" b="0" dirty="0" smtClean="0">
+            <a:endParaRPr lang="en-US" sz="4800" b="0" dirty="0">
               <a:solidFill>
                 <a:schemeClr val="tx1"/>
               </a:solidFill>
@@ -4921,7 +4859,7 @@
               <a:buAutoNum type="arabicParenR"/>
             </a:pPr>
             <a:r>
-              <a:rPr lang="en-US" sz="4800" b="0" dirty="0" smtClean="0">
+              <a:rPr lang="en-US" sz="4800" b="0" dirty="0">
                 <a:solidFill>
                   <a:schemeClr val="tx1"/>
                 </a:solidFill>
@@ -4931,7 +4869,7 @@
               <a:t>Less sensitive with development</a:t>
             </a:r>
             <a:r>
-              <a:rPr lang="en-US" sz="4800" b="0" baseline="30000" dirty="0" smtClean="0">
+              <a:rPr lang="en-US" sz="4800" b="0" baseline="30000" dirty="0">
                 <a:solidFill>
                   <a:schemeClr val="tx1"/>
                 </a:solidFill>
@@ -4940,7 +4878,7 @@
               </a:rPr>
               <a:t>2</a:t>
             </a:r>
-            <a:endParaRPr lang="en-US" sz="4800" b="0" dirty="0" smtClean="0">
+            <a:endParaRPr lang="en-US" sz="4800" b="0" dirty="0">
               <a:solidFill>
                 <a:schemeClr val="tx1"/>
               </a:solidFill>
@@ -4957,7 +4895,7 @@
               <a:buAutoNum type="arabicParenR"/>
             </a:pPr>
             <a:r>
-              <a:rPr lang="en-US" sz="4800" b="0" dirty="0" smtClean="0">
+              <a:rPr lang="en-US" sz="4800" b="0" dirty="0">
                 <a:solidFill>
                   <a:schemeClr val="tx1"/>
                 </a:solidFill>
@@ -4966,20 +4904,6 @@
               </a:rPr>
               <a:t>No change in sensitivity with development</a:t>
             </a:r>
-          </a:p>
-          <a:p>
-            <a:pPr lvl="0">
-              <a:spcAft>
-                <a:spcPts val="1200"/>
-              </a:spcAft>
-            </a:pPr>
-            <a:endParaRPr lang="en-US" sz="4800" b="0" dirty="0" smtClean="0">
-              <a:solidFill>
-                <a:schemeClr val="tx1"/>
-              </a:solidFill>
-              <a:latin typeface="Times"/>
-              <a:cs typeface="Times"/>
-            </a:endParaRPr>
           </a:p>
           <a:p>
             <a:pPr lvl="0">
@@ -5094,214 +5018,11 @@
             </a:endParaRPr>
           </a:p>
           <a:p>
-            <a:pPr algn="ctr"/>
-            <a:r>
-              <a:rPr lang="en-US" sz="4800" u="sng" dirty="0">
-                <a:solidFill>
-                  <a:schemeClr val="tx1"/>
-                </a:solidFill>
-                <a:latin typeface="Times"/>
-                <a:cs typeface="Times"/>
-              </a:rPr>
-              <a:t>Correct </a:t>
-            </a:r>
-          </a:p>
-          <a:p>
-            <a:r>
-              <a:rPr lang="en-US" sz="4800" b="0" dirty="0">
-                <a:solidFill>
-                  <a:schemeClr val="tx1"/>
-                </a:solidFill>
-                <a:latin typeface="Times"/>
-                <a:cs typeface="Times"/>
-              </a:rPr>
-              <a:t>Recognition: </a:t>
-            </a:r>
-            <a:r>
-              <a:rPr lang="en-US" sz="4800" b="0" i="1" dirty="0">
-                <a:solidFill>
-                  <a:schemeClr val="tx1"/>
-                </a:solidFill>
-                <a:latin typeface="Times"/>
-                <a:cs typeface="Times"/>
-              </a:rPr>
-              <a:t>g</a:t>
-            </a:r>
-            <a:r>
-              <a:rPr lang="en-US" sz="4800" b="0" dirty="0">
-                <a:solidFill>
-                  <a:schemeClr val="tx1"/>
-                </a:solidFill>
-                <a:latin typeface="Times"/>
-                <a:cs typeface="Times"/>
-              </a:rPr>
-              <a:t> = 0.91, SE = 0.12, </a:t>
-            </a:r>
-            <a:r>
-              <a:rPr lang="en-US" sz="4800" b="0" i="1" dirty="0">
-                <a:solidFill>
-                  <a:schemeClr val="tx1"/>
-                </a:solidFill>
-                <a:latin typeface="Times"/>
-                <a:cs typeface="Times"/>
-              </a:rPr>
-              <a:t>p</a:t>
-            </a:r>
-            <a:r>
-              <a:rPr lang="en-US" sz="4800" b="0" dirty="0">
-                <a:solidFill>
-                  <a:schemeClr val="tx1"/>
-                </a:solidFill>
-                <a:latin typeface="Times"/>
-                <a:cs typeface="Times"/>
-              </a:rPr>
-              <a:t> &lt; .0001 </a:t>
-            </a:r>
-          </a:p>
-          <a:p>
-            <a:pPr algn="ctr"/>
-            <a:r>
-              <a:rPr lang="en-US" sz="4800" u="sng" dirty="0">
-                <a:solidFill>
-                  <a:schemeClr val="tx1"/>
-                </a:solidFill>
-                <a:latin typeface="Times"/>
-                <a:cs typeface="Times"/>
-              </a:rPr>
-              <a:t>Mispronunciation</a:t>
-            </a:r>
-          </a:p>
-          <a:p>
-            <a:r>
-              <a:rPr lang="en-US" sz="4800" b="0" dirty="0">
-                <a:solidFill>
-                  <a:schemeClr val="tx1"/>
-                </a:solidFill>
-                <a:latin typeface="Times"/>
-                <a:cs typeface="Times"/>
-              </a:rPr>
-              <a:t>Recognition: </a:t>
-            </a:r>
-            <a:r>
-              <a:rPr lang="en-US" sz="4800" b="0" i="1" dirty="0">
-                <a:solidFill>
-                  <a:schemeClr val="tx1"/>
-                </a:solidFill>
-                <a:latin typeface="Times"/>
-                <a:cs typeface="Times"/>
-              </a:rPr>
-              <a:t>g</a:t>
-            </a:r>
-            <a:r>
-              <a:rPr lang="en-US" sz="4800" b="0" dirty="0">
-                <a:solidFill>
-                  <a:schemeClr val="tx1"/>
-                </a:solidFill>
-                <a:latin typeface="Times"/>
-                <a:cs typeface="Times"/>
-              </a:rPr>
-              <a:t> = 0.25, SE = 0.06, p &lt; .0001</a:t>
-            </a:r>
-          </a:p>
-          <a:p>
-            <a:pPr algn="ctr"/>
-            <a:r>
-              <a:rPr lang="en-US" sz="4800" u="sng" dirty="0">
-                <a:solidFill>
-                  <a:schemeClr val="tx1"/>
-                </a:solidFill>
-                <a:latin typeface="Times"/>
-                <a:cs typeface="Times"/>
-              </a:rPr>
-              <a:t>Correct vs. Mispronunciation</a:t>
-            </a:r>
-          </a:p>
-          <a:p>
-            <a:r>
-              <a:rPr lang="en-US" sz="4800" b="0" dirty="0">
-                <a:solidFill>
-                  <a:schemeClr val="tx1"/>
-                </a:solidFill>
-                <a:latin typeface="Times"/>
-                <a:cs typeface="Times"/>
-              </a:rPr>
-              <a:t>Sensitivity: </a:t>
-            </a:r>
-            <a:r>
-              <a:rPr lang="en-US" sz="4800" b="0" i="1" dirty="0">
-                <a:solidFill>
-                  <a:schemeClr val="tx1"/>
-                </a:solidFill>
-                <a:latin typeface="Times"/>
-                <a:cs typeface="Times"/>
-              </a:rPr>
-              <a:t>g</a:t>
-            </a:r>
-            <a:r>
-              <a:rPr lang="en-US" sz="4800" b="0" dirty="0">
-                <a:solidFill>
-                  <a:schemeClr val="tx1"/>
-                </a:solidFill>
-                <a:latin typeface="Times"/>
-                <a:cs typeface="Times"/>
-              </a:rPr>
-              <a:t> = .5, SE = .03, </a:t>
-            </a:r>
-            <a:r>
-              <a:rPr lang="en-US" sz="4800" b="0" i="1" dirty="0">
-                <a:solidFill>
-                  <a:schemeClr val="tx1"/>
-                </a:solidFill>
-                <a:latin typeface="Times"/>
-                <a:cs typeface="Times"/>
-              </a:rPr>
-              <a:t>p</a:t>
-            </a:r>
-            <a:r>
-              <a:rPr lang="en-US" sz="4800" b="0" dirty="0">
-                <a:solidFill>
-                  <a:schemeClr val="tx1"/>
-                </a:solidFill>
-                <a:latin typeface="Times"/>
-                <a:cs typeface="Times"/>
-              </a:rPr>
-              <a:t> &lt; .0001</a:t>
-            </a:r>
-          </a:p>
-          <a:p>
-            <a:pPr algn="ctr"/>
-            <a:r>
-              <a:rPr lang="en-US" sz="4800" u="sng" dirty="0">
-                <a:solidFill>
-                  <a:schemeClr val="tx1"/>
-                </a:solidFill>
-                <a:latin typeface="Times"/>
-                <a:cs typeface="Times"/>
-              </a:rPr>
-              <a:t>Interactions with Age</a:t>
-            </a:r>
-          </a:p>
-          <a:p>
-            <a:r>
-              <a:rPr lang="en-US" sz="4800" b="0" dirty="0">
-                <a:solidFill>
-                  <a:schemeClr val="tx1"/>
-                </a:solidFill>
-                <a:latin typeface="Times"/>
-                <a:cs typeface="Times"/>
-              </a:rPr>
-              <a:t>No significant interactions with </a:t>
-            </a:r>
-            <a:r>
-              <a:rPr lang="en-US" sz="4800" b="0" dirty="0" smtClean="0">
-                <a:solidFill>
-                  <a:schemeClr val="tx1"/>
-                </a:solidFill>
-                <a:latin typeface="Times"/>
-                <a:cs typeface="Times"/>
-              </a:rPr>
-              <a:t>Age</a:t>
-            </a:r>
+            <a:pPr lvl="0">
+              <a:spcAft>
+                <a:spcPts val="1200"/>
+              </a:spcAft>
+            </a:pPr>
             <a:endParaRPr lang="en-US" sz="4800" b="0" dirty="0">
               <a:solidFill>
                 <a:schemeClr val="tx1"/>
@@ -5309,6 +5030,206 @@
               <a:latin typeface="Times"/>
               <a:cs typeface="Times"/>
             </a:endParaRPr>
+          </a:p>
+          <a:p>
+            <a:pPr algn="ctr"/>
+            <a:r>
+              <a:rPr lang="en-US" sz="4800" u="sng" dirty="0">
+                <a:solidFill>
+                  <a:schemeClr val="tx1"/>
+                </a:solidFill>
+                <a:latin typeface="Times"/>
+                <a:cs typeface="Times"/>
+              </a:rPr>
+              <a:t>Correct </a:t>
+            </a:r>
+          </a:p>
+          <a:p>
+            <a:r>
+              <a:rPr lang="en-US" sz="4800" b="0" dirty="0">
+                <a:solidFill>
+                  <a:schemeClr val="tx1"/>
+                </a:solidFill>
+                <a:latin typeface="Times"/>
+                <a:cs typeface="Times"/>
+              </a:rPr>
+              <a:t>Recognition: </a:t>
+            </a:r>
+            <a:r>
+              <a:rPr lang="en-US" sz="4800" b="0" i="1" dirty="0">
+                <a:solidFill>
+                  <a:schemeClr val="tx1"/>
+                </a:solidFill>
+                <a:latin typeface="Times"/>
+                <a:cs typeface="Times"/>
+              </a:rPr>
+              <a:t>g</a:t>
+            </a:r>
+            <a:r>
+              <a:rPr lang="en-US" sz="4800" b="0" dirty="0">
+                <a:solidFill>
+                  <a:schemeClr val="tx1"/>
+                </a:solidFill>
+                <a:latin typeface="Times"/>
+                <a:cs typeface="Times"/>
+              </a:rPr>
+              <a:t> = 0.91, SE = 0.12, </a:t>
+            </a:r>
+            <a:r>
+              <a:rPr lang="en-US" sz="4800" b="0" i="1" dirty="0">
+                <a:solidFill>
+                  <a:schemeClr val="tx1"/>
+                </a:solidFill>
+                <a:latin typeface="Times"/>
+                <a:cs typeface="Times"/>
+              </a:rPr>
+              <a:t>p</a:t>
+            </a:r>
+            <a:r>
+              <a:rPr lang="en-US" sz="4800" b="0" dirty="0">
+                <a:solidFill>
+                  <a:schemeClr val="tx1"/>
+                </a:solidFill>
+                <a:latin typeface="Times"/>
+                <a:cs typeface="Times"/>
+              </a:rPr>
+              <a:t> &lt; .0001 </a:t>
+            </a:r>
+          </a:p>
+          <a:p>
+            <a:pPr algn="ctr"/>
+            <a:r>
+              <a:rPr lang="en-US" sz="4800" u="sng" dirty="0">
+                <a:solidFill>
+                  <a:schemeClr val="tx1"/>
+                </a:solidFill>
+                <a:latin typeface="Times"/>
+                <a:cs typeface="Times"/>
+              </a:rPr>
+              <a:t>Mispronunciation</a:t>
+            </a:r>
+          </a:p>
+          <a:p>
+            <a:r>
+              <a:rPr lang="en-US" sz="4800" b="0" dirty="0">
+                <a:solidFill>
+                  <a:schemeClr val="tx1"/>
+                </a:solidFill>
+                <a:latin typeface="Times"/>
+                <a:cs typeface="Times"/>
+              </a:rPr>
+              <a:t>Recognition: </a:t>
+            </a:r>
+            <a:r>
+              <a:rPr lang="en-US" sz="4800" b="0" i="1" dirty="0">
+                <a:solidFill>
+                  <a:schemeClr val="tx1"/>
+                </a:solidFill>
+                <a:latin typeface="Times"/>
+                <a:cs typeface="Times"/>
+              </a:rPr>
+              <a:t>g</a:t>
+            </a:r>
+            <a:r>
+              <a:rPr lang="en-US" sz="4800" b="0" dirty="0">
+                <a:solidFill>
+                  <a:schemeClr val="tx1"/>
+                </a:solidFill>
+                <a:latin typeface="Times"/>
+                <a:cs typeface="Times"/>
+              </a:rPr>
+              <a:t> = 0.25, SE = 0.06, p &lt; .0001</a:t>
+            </a:r>
+          </a:p>
+          <a:p>
+            <a:pPr algn="ctr"/>
+            <a:r>
+              <a:rPr lang="en-US" sz="4800" u="sng" dirty="0">
+                <a:solidFill>
+                  <a:schemeClr val="tx1"/>
+                </a:solidFill>
+                <a:latin typeface="Times"/>
+                <a:cs typeface="Times"/>
+              </a:rPr>
+              <a:t>Correct vs. Mispronunciation</a:t>
+            </a:r>
+          </a:p>
+          <a:p>
+            <a:r>
+              <a:rPr lang="en-US" sz="4800" b="0" dirty="0">
+                <a:solidFill>
+                  <a:schemeClr val="tx1"/>
+                </a:solidFill>
+                <a:latin typeface="Times"/>
+                <a:cs typeface="Times"/>
+              </a:rPr>
+              <a:t>Sensitivity: </a:t>
+            </a:r>
+            <a:r>
+              <a:rPr lang="en-US" sz="4800" b="0" i="1" dirty="0">
+                <a:solidFill>
+                  <a:schemeClr val="tx1"/>
+                </a:solidFill>
+                <a:latin typeface="Times"/>
+                <a:cs typeface="Times"/>
+              </a:rPr>
+              <a:t>g</a:t>
+            </a:r>
+            <a:r>
+              <a:rPr lang="en-US" sz="4800" b="0" dirty="0">
+                <a:solidFill>
+                  <a:schemeClr val="tx1"/>
+                </a:solidFill>
+                <a:latin typeface="Times"/>
+                <a:cs typeface="Times"/>
+              </a:rPr>
+              <a:t> = .5, SE = .03, </a:t>
+            </a:r>
+            <a:r>
+              <a:rPr lang="en-US" sz="4800" b="0" i="1" dirty="0">
+                <a:solidFill>
+                  <a:schemeClr val="tx1"/>
+                </a:solidFill>
+                <a:latin typeface="Times"/>
+                <a:cs typeface="Times"/>
+              </a:rPr>
+              <a:t>p</a:t>
+            </a:r>
+            <a:r>
+              <a:rPr lang="en-US" sz="4800" b="0" dirty="0">
+                <a:solidFill>
+                  <a:schemeClr val="tx1"/>
+                </a:solidFill>
+                <a:latin typeface="Times"/>
+                <a:cs typeface="Times"/>
+              </a:rPr>
+              <a:t> &lt; .0001</a:t>
+            </a:r>
+          </a:p>
+          <a:p>
+            <a:pPr algn="ctr"/>
+            <a:r>
+              <a:rPr lang="en-US" sz="4800" u="sng" dirty="0">
+                <a:solidFill>
+                  <a:schemeClr val="tx1"/>
+                </a:solidFill>
+                <a:latin typeface="Times"/>
+                <a:cs typeface="Times"/>
+              </a:rPr>
+              <a:t>Interactions with Age</a:t>
+            </a:r>
+          </a:p>
+          <a:p>
+            <a:r>
+              <a:rPr lang="en-US" sz="4800" b="0" dirty="0">
+                <a:solidFill>
+                  <a:schemeClr val="tx1"/>
+                </a:solidFill>
+                <a:latin typeface="Times"/>
+                <a:cs typeface="Times"/>
+              </a:rPr>
+              <a:t>No significant interactions with Age</a:t>
+            </a:r>
           </a:p>
         </p:txBody>
       </p:sp>
@@ -5353,10 +5274,9 @@
           <a:p>
             <a:pPr algn="ctr"/>
             <a:r>
-              <a:rPr lang="en-US" sz="4800" dirty="0" smtClean="0"/>
+              <a:rPr lang="en-US" sz="4800" dirty="0"/>
               <a:t>Tog</a:t>
             </a:r>
-            <a:endParaRPr lang="en-US" sz="4800" dirty="0"/>
           </a:p>
         </p:txBody>
       </p:sp>
@@ -5401,10 +5321,9 @@
           <a:p>
             <a:pPr algn="ctr"/>
             <a:r>
-              <a:rPr lang="en-US" sz="4800" dirty="0" smtClean="0"/>
+              <a:rPr lang="en-US" sz="4800" dirty="0"/>
               <a:t>Dog</a:t>
             </a:r>
-            <a:endParaRPr lang="en-US" sz="4800" dirty="0"/>
           </a:p>
         </p:txBody>
       </p:sp>
@@ -5417,14 +5336,14 @@
           <p:nvPr>
             <p:extLst>
               <p:ext uri="{D42A27DB-BD31-4B8C-83A1-F6EECF244321}">
-                <p14:modId xmlns:p14="http://schemas.microsoft.com/office/powerpoint/2010/main" val="3057733611"/>
+                <p14:modId xmlns:p14="http://schemas.microsoft.com/office/powerpoint/2010/main" val="2631765230"/>
               </p:ext>
             </p:extLst>
           </p:nvPr>
         </p:nvGraphicFramePr>
         <p:xfrm>
           <a:off x="13769454" y="11176745"/>
-          <a:ext cx="16201801" cy="3614596"/>
+          <a:ext cx="15602252" cy="3571592"/>
         </p:xfrm>
         <a:graphic>
           <a:graphicData uri="http://schemas.openxmlformats.org/drawingml/2006/table">
@@ -5433,10 +5352,34 @@
                 <a:tableStyleId>{5C22544A-7EE6-4342-B048-85BDC9FD1C3A}</a:tableStyleId>
               </a:tblPr>
               <a:tblGrid>
-                <a:gridCol w="4333618"/>
-                <a:gridCol w="4419709"/>
-                <a:gridCol w="3791910"/>
-                <a:gridCol w="3656564"/>
+                <a:gridCol w="4333618">
+                  <a:extLst>
+                    <a:ext uri="{9D8B030D-6E8A-4147-A177-3AD203B41FA5}">
+                      <a16:colId xmlns:a16="http://schemas.microsoft.com/office/drawing/2014/main" val="20000"/>
+                    </a:ext>
+                  </a:extLst>
+                </a:gridCol>
+                <a:gridCol w="3820160">
+                  <a:extLst>
+                    <a:ext uri="{9D8B030D-6E8A-4147-A177-3AD203B41FA5}">
+                      <a16:colId xmlns:a16="http://schemas.microsoft.com/office/drawing/2014/main" val="20001"/>
+                    </a:ext>
+                  </a:extLst>
+                </a:gridCol>
+                <a:gridCol w="4015574">
+                  <a:extLst>
+                    <a:ext uri="{9D8B030D-6E8A-4147-A177-3AD203B41FA5}">
+                      <a16:colId xmlns:a16="http://schemas.microsoft.com/office/drawing/2014/main" val="20002"/>
+                    </a:ext>
+                  </a:extLst>
+                </a:gridCol>
+                <a:gridCol w="3432900">
+                  <a:extLst>
+                    <a:ext uri="{9D8B030D-6E8A-4147-A177-3AD203B41FA5}">
+                      <a16:colId xmlns:a16="http://schemas.microsoft.com/office/drawing/2014/main" val="20003"/>
+                    </a:ext>
+                  </a:extLst>
+                </a:gridCol>
               </a:tblGrid>
               <a:tr h="892898">
                 <a:tc>
@@ -5585,6 +5528,11 @@
                     </a:solidFill>
                   </a:tcPr>
                 </a:tc>
+                <a:extLst>
+                  <a:ext uri="{0D108BD9-81ED-4DB2-BD59-A6C34878D82A}">
+                    <a16:rowId xmlns:a16="http://schemas.microsoft.com/office/drawing/2014/main" val="10000"/>
+                  </a:ext>
+                </a:extLst>
               </a:tr>
               <a:tr h="892898">
                 <a:tc>
@@ -5653,23 +5601,8 @@
                           <a:ea typeface="ＭＳ 明朝"/>
                           <a:cs typeface="Times"/>
                         </a:rPr>
-                        <a:t># </a:t>
+                        <a:t># features</a:t>
                       </a:r>
-                      <a:r>
-                        <a:rPr lang="en-US" sz="4000" dirty="0" smtClean="0">
-                          <a:effectLst/>
-                          <a:latin typeface="Times"/>
-                          <a:ea typeface="ＭＳ 明朝"/>
-                          <a:cs typeface="Times"/>
-                        </a:rPr>
-                        <a:t>features</a:t>
-                      </a:r>
-                      <a:endParaRPr lang="en-US" sz="4000" dirty="0">
-                        <a:effectLst/>
-                        <a:latin typeface="Times"/>
-                        <a:ea typeface="ＭＳ 明朝"/>
-                        <a:cs typeface="Times"/>
-                      </a:endParaRPr>
                     </a:p>
                   </a:txBody>
                   <a:tcPr marL="68580" marR="68580" marT="0" marB="0">
@@ -5714,23 +5647,8 @@
                           <a:ea typeface="ＭＳ 明朝"/>
                           <a:cs typeface="Times"/>
                         </a:rPr>
-                        <a:t># </a:t>
+                        <a:t># trials</a:t>
                       </a:r>
-                      <a:r>
-                        <a:rPr lang="en-US" sz="4000" dirty="0" smtClean="0">
-                          <a:effectLst/>
-                          <a:latin typeface="Times"/>
-                          <a:ea typeface="ＭＳ 明朝"/>
-                          <a:cs typeface="Times"/>
-                        </a:rPr>
-                        <a:t>trials</a:t>
-                      </a:r>
-                      <a:endParaRPr lang="en-US" sz="4000" dirty="0">
-                        <a:effectLst/>
-                        <a:latin typeface="Times"/>
-                        <a:ea typeface="ＭＳ 明朝"/>
-                        <a:cs typeface="Times"/>
-                      </a:endParaRPr>
                     </a:p>
                   </a:txBody>
                   <a:tcPr marL="68580" marR="68580" marT="0" marB="0">
@@ -5769,22 +5687,13 @@
                         </a:spcAft>
                       </a:pPr>
                       <a:r>
-                        <a:rPr lang="en-US" sz="4000" dirty="0" smtClean="0">
-                          <a:effectLst/>
-                          <a:latin typeface="Times"/>
-                          <a:ea typeface="ＭＳ 明朝"/>
-                          <a:cs typeface="Times"/>
-                        </a:rPr>
-                        <a:t>DV </a:t>
-                      </a:r>
-                      <a:r>
                         <a:rPr lang="en-US" sz="4000" dirty="0">
                           <a:effectLst/>
                           <a:latin typeface="Times"/>
                           <a:ea typeface="ＭＳ 明朝"/>
                           <a:cs typeface="Times"/>
                         </a:rPr>
-                        <a:t>type</a:t>
+                        <a:t>DV type</a:t>
                       </a:r>
                     </a:p>
                   </a:txBody>
@@ -5810,6 +5719,11 @@
                     <a:noFill/>
                   </a:tcPr>
                 </a:tc>
+                <a:extLst>
+                  <a:ext uri="{0D108BD9-81ED-4DB2-BD59-A6C34878D82A}">
+                    <a16:rowId xmlns:a16="http://schemas.microsoft.com/office/drawing/2014/main" val="10001"/>
+                  </a:ext>
+                </a:extLst>
               </a:tr>
               <a:tr h="892898">
                 <a:tc>
@@ -5890,7 +5804,7 @@
                         </a:spcAft>
                       </a:pPr>
                       <a:r>
-                        <a:rPr lang="en-US" sz="4000" dirty="0" smtClean="0">
+                        <a:rPr lang="en-US" sz="4000" dirty="0">
                           <a:effectLst/>
                           <a:latin typeface="Times"/>
                           <a:ea typeface="ＭＳ 明朝"/>
@@ -5898,12 +5812,6 @@
                         </a:rPr>
                         <a:t>Change position</a:t>
                       </a:r>
-                      <a:endParaRPr lang="en-US" sz="4000" dirty="0">
-                        <a:effectLst/>
-                        <a:latin typeface="Times"/>
-                        <a:ea typeface="ＭＳ 明朝"/>
-                        <a:cs typeface="Times"/>
-                      </a:endParaRPr>
                     </a:p>
                   </a:txBody>
                   <a:tcPr marL="68580" marR="68580" marT="0" marB="0">
@@ -5948,23 +5856,8 @@
                           <a:ea typeface="ＭＳ 明朝"/>
                           <a:cs typeface="Times"/>
                         </a:rPr>
-                        <a:t>Distractor </a:t>
+                        <a:t>Distractor familiarity/overlap</a:t>
                       </a:r>
-                      <a:r>
-                        <a:rPr lang="en-US" sz="4000" dirty="0" smtClean="0">
-                          <a:effectLst/>
-                          <a:latin typeface="Times"/>
-                          <a:ea typeface="ＭＳ 明朝"/>
-                          <a:cs typeface="Times"/>
-                        </a:rPr>
-                        <a:t>familiarity/overlap</a:t>
-                      </a:r>
-                      <a:endParaRPr lang="en-US" sz="4000" dirty="0">
-                        <a:effectLst/>
-                        <a:latin typeface="Times"/>
-                        <a:ea typeface="ＭＳ 明朝"/>
-                        <a:cs typeface="Times"/>
-                      </a:endParaRPr>
                     </a:p>
                   </a:txBody>
                   <a:tcPr marL="68580" marR="68580" marT="0" marB="0">
@@ -6012,7 +5905,7 @@
                         </a:spcAft>
                       </a:pPr>
                       <a:r>
-                        <a:rPr lang="en-US" sz="4000" dirty="0" smtClean="0">
+                        <a:rPr lang="en-US" sz="4000" dirty="0">
                           <a:effectLst/>
                           <a:latin typeface="Times"/>
                           <a:ea typeface="ＭＳ 明朝"/>
@@ -6020,12 +5913,6 @@
                         </a:rPr>
                         <a:t>vocabulary</a:t>
                       </a:r>
-                      <a:endParaRPr lang="en-US" sz="4000" dirty="0">
-                        <a:effectLst/>
-                        <a:latin typeface="Times"/>
-                        <a:ea typeface="ＭＳ 明朝"/>
-                        <a:cs typeface="Times"/>
-                      </a:endParaRPr>
                     </a:p>
                   </a:txBody>
                   <a:tcPr marL="68580" marR="68580" marT="0" marB="0">
@@ -6050,6 +5937,11 @@
                     <a:noFill/>
                   </a:tcPr>
                 </a:tc>
+                <a:extLst>
+                  <a:ext uri="{0D108BD9-81ED-4DB2-BD59-A6C34878D82A}">
+                    <a16:rowId xmlns:a16="http://schemas.microsoft.com/office/drawing/2014/main" val="10002"/>
+                  </a:ext>
+                </a:extLst>
               </a:tr>
               <a:tr h="892898">
                 <a:tc>
@@ -6121,7 +6013,7 @@
                         </a:spcAft>
                       </a:pPr>
                       <a:r>
-                        <a:rPr lang="en-US" sz="4000" dirty="0" smtClean="0">
+                        <a:rPr lang="en-US" sz="4000" dirty="0">
                           <a:effectLst/>
                           <a:latin typeface="Times"/>
                           <a:ea typeface="ＭＳ 明朝"/>
@@ -6129,12 +6021,6 @@
                         </a:rPr>
                         <a:t>Consonant/vowel</a:t>
                       </a:r>
-                      <a:endParaRPr lang="en-US" sz="4000" dirty="0">
-                        <a:effectLst/>
-                        <a:latin typeface="Times"/>
-                        <a:ea typeface="ＭＳ 明朝"/>
-                        <a:cs typeface="Times"/>
-                      </a:endParaRPr>
                     </a:p>
                   </a:txBody>
                   <a:tcPr marL="68580" marR="68580" marT="0" marB="0">
@@ -6284,6 +6170,11 @@
                     <a:noFill/>
                   </a:tcPr>
                 </a:tc>
+                <a:extLst>
+                  <a:ext uri="{0D108BD9-81ED-4DB2-BD59-A6C34878D82A}">
+                    <a16:rowId xmlns:a16="http://schemas.microsoft.com/office/drawing/2014/main" val="10003"/>
+                  </a:ext>
+                </a:extLst>
               </a:tr>
             </a:tbl>
           </a:graphicData>
@@ -6385,7 +6276,7 @@
           <a:p>
             <a:pPr algn="ctr"/>
             <a:r>
-              <a:rPr lang="en-US" sz="4400" u="sng" dirty="0" smtClean="0">
+              <a:rPr lang="en-US" sz="4400" u="sng" dirty="0">
                 <a:solidFill>
                   <a:schemeClr val="tx1"/>
                 </a:solidFill>
@@ -6398,7 +6289,7 @@
           <a:p>
             <a:pPr algn="ctr"/>
             <a:r>
-              <a:rPr lang="en-US" sz="4400" b="0" dirty="0" smtClean="0">
+              <a:rPr lang="en-US" sz="4400" b="0" dirty="0">
                 <a:solidFill>
                   <a:schemeClr val="tx1"/>
                 </a:solidFill>
@@ -6411,7 +6302,7 @@
           <a:p>
             <a:pPr algn="ctr"/>
             <a:r>
-              <a:rPr lang="en-US" sz="4400" b="0" dirty="0" smtClean="0">
+              <a:rPr lang="en-US" sz="4400" b="0" dirty="0">
                 <a:solidFill>
                   <a:schemeClr val="tx1"/>
                 </a:solidFill>
@@ -6432,7 +6323,7 @@
           <p:nvPr/>
         </p:nvPicPr>
         <p:blipFill>
-          <a:blip r:embed="rId7">
+          <a:blip r:embed="rId7" cstate="print">
             <a:extLst>
               <a:ext uri="{28A0092B-C50C-407E-A947-70E740481C1C}">
                 <a14:useLocalDpi xmlns:a14="http://schemas.microsoft.com/office/drawing/2010/main" val="0"/>
@@ -6476,18 +6367,13 @@
           <a:lstStyle/>
           <a:p>
             <a:r>
-              <a:rPr lang="en-US" sz="4800" dirty="0" smtClean="0">
+              <a:rPr lang="en-US" sz="4800" dirty="0">
                 <a:solidFill>
                   <a:schemeClr val="tx1"/>
                 </a:solidFill>
               </a:rPr>
               <a:t>References</a:t>
             </a:r>
-            <a:endParaRPr lang="en-US" sz="4800" dirty="0">
-              <a:solidFill>
-                <a:schemeClr val="tx1"/>
-              </a:solidFill>
-            </a:endParaRPr>
           </a:p>
         </p:txBody>
       </p:sp>
@@ -6516,7 +6402,7 @@
               <a:buAutoNum type="arabicPeriod"/>
             </a:pPr>
             <a:r>
-              <a:rPr lang="en-US" sz="2800" dirty="0" err="1" smtClean="0">
+              <a:rPr lang="en-US" sz="2800" dirty="0" err="1">
                 <a:solidFill>
                   <a:srgbClr val="000000"/>
                 </a:solidFill>
@@ -6524,62 +6410,30 @@
               <a:t>Werker</a:t>
             </a:r>
             <a:r>
-              <a:rPr lang="en-US" sz="2800" dirty="0" smtClean="0">
+              <a:rPr lang="en-US" sz="2800" dirty="0">
                 <a:solidFill>
                   <a:srgbClr val="000000"/>
                 </a:solidFill>
               </a:rPr>
-              <a:t> </a:t>
-            </a:r>
-            <a:r>
-              <a:rPr lang="en-US" sz="2800" dirty="0">
+              <a:t> &amp; Curtin (2005). PRIMIR: A Developmental Framework of Infant Speech Processing. </a:t>
+            </a:r>
+            <a:r>
+              <a:rPr lang="en-US" sz="2800" i="1" dirty="0">
                 <a:solidFill>
                   <a:srgbClr val="000000"/>
                 </a:solidFill>
               </a:rPr>
-              <a:t>&amp; </a:t>
-            </a:r>
-            <a:r>
-              <a:rPr lang="en-US" sz="2800" dirty="0" smtClean="0">
-                <a:solidFill>
-                  <a:srgbClr val="000000"/>
-                </a:solidFill>
-              </a:rPr>
-              <a:t>Curtin </a:t>
-            </a:r>
-            <a:r>
-              <a:rPr lang="en-US" sz="2800" dirty="0">
-                <a:solidFill>
-                  <a:srgbClr val="000000"/>
-                </a:solidFill>
-              </a:rPr>
-              <a:t>(2005). PRIMIR: A Developmental Framework of Infant Speech Processing. </a:t>
-            </a:r>
-            <a:r>
-              <a:rPr lang="en-US" sz="2800" i="1" dirty="0" smtClean="0">
-                <a:solidFill>
-                  <a:srgbClr val="000000"/>
-                </a:solidFill>
-              </a:rPr>
-              <a:t>Lang Learn </a:t>
-            </a:r>
-            <a:r>
-              <a:rPr lang="en-US" sz="2800" i="1" dirty="0">
-                <a:solidFill>
-                  <a:srgbClr val="000000"/>
-                </a:solidFill>
-              </a:rPr>
-              <a:t>and </a:t>
-            </a:r>
-            <a:r>
-              <a:rPr lang="en-US" sz="2800" i="1" dirty="0" err="1" smtClean="0">
+              <a:t>Lang Learn and </a:t>
+            </a:r>
+            <a:r>
+              <a:rPr lang="en-US" sz="2800" i="1" dirty="0" err="1">
                 <a:solidFill>
                   <a:srgbClr val="000000"/>
                 </a:solidFill>
               </a:rPr>
               <a:t>Dev</a:t>
             </a:r>
-            <a:endParaRPr lang="en-US" sz="2800" i="1" dirty="0" smtClean="0">
+            <a:endParaRPr lang="en-US" sz="2800" i="1" dirty="0">
               <a:solidFill>
                 <a:srgbClr val="000000"/>
               </a:solidFill>
@@ -6590,36 +6444,20 @@
               <a:buAutoNum type="arabicPeriod"/>
             </a:pPr>
             <a:r>
-              <a:rPr lang="en-US" sz="2800" dirty="0" smtClean="0">
+              <a:rPr lang="en-US" sz="2800" dirty="0">
                 <a:solidFill>
                   <a:srgbClr val="000000"/>
                 </a:solidFill>
               </a:rPr>
-              <a:t>Best (</a:t>
-            </a:r>
-            <a:r>
-              <a:rPr lang="en-US" sz="2800" dirty="0">
+              <a:t>Best (1994). The emergence of native-language phonological influences in infants: A perceptual assimilation model. </a:t>
+            </a:r>
+            <a:r>
+              <a:rPr lang="en-US" sz="2800" i="1" dirty="0">
                 <a:solidFill>
                   <a:srgbClr val="000000"/>
                 </a:solidFill>
               </a:rPr>
-              <a:t>1994). The emergence of native-language phonological influences in infants: A perceptual assimilation model. </a:t>
-            </a:r>
-            <a:r>
-              <a:rPr lang="en-US" sz="2800" i="1" dirty="0">
-                <a:solidFill>
-                  <a:srgbClr val="000000"/>
-                </a:solidFill>
-              </a:rPr>
-              <a:t>Haskins Laboratories Status Report on Speech </a:t>
-            </a:r>
-            <a:r>
-              <a:rPr lang="en-US" sz="2800" i="1" dirty="0" smtClean="0">
-                <a:solidFill>
-                  <a:srgbClr val="000000"/>
-                </a:solidFill>
-              </a:rPr>
-              <a:t>Research</a:t>
+              <a:t>Haskins Laboratories Status Report on Speech Research</a:t>
             </a:r>
           </a:p>
           <a:p>
@@ -6627,7 +6465,7 @@
               <a:buAutoNum type="arabicPeriod"/>
             </a:pPr>
             <a:r>
-              <a:rPr lang="en-US" sz="2800" dirty="0" smtClean="0">
+              <a:rPr lang="en-US" sz="2800" dirty="0">
                 <a:solidFill>
                   <a:srgbClr val="000000"/>
                 </a:solidFill>
@@ -6635,14 +6473,14 @@
               <a:t>White &amp; Morgan (2008). Sub-segmental detail in early lexical representations. </a:t>
             </a:r>
             <a:r>
-              <a:rPr lang="en-US" sz="2800" i="1" dirty="0" smtClean="0">
+              <a:rPr lang="en-US" sz="2800" i="1" dirty="0">
                 <a:solidFill>
                   <a:srgbClr val="000000"/>
                 </a:solidFill>
               </a:rPr>
               <a:t>Journal of Memory and Cognition</a:t>
             </a:r>
-            <a:endParaRPr lang="en-US" sz="2800" dirty="0" smtClean="0">
+            <a:endParaRPr lang="en-US" sz="2800" dirty="0">
               <a:solidFill>
                 <a:srgbClr val="000000"/>
               </a:solidFill>
@@ -6675,25 +6513,17 @@
                   <a:srgbClr val="000000"/>
                 </a:solidFill>
               </a:rPr>
-              <a:t> cues to vowel mispronunciation </a:t>
-            </a:r>
-            <a:r>
-              <a:rPr lang="en-US" sz="2800" dirty="0" smtClean="0">
-                <a:solidFill>
-                  <a:srgbClr val="000000"/>
-                </a:solidFill>
-              </a:rPr>
-              <a:t>detection. </a:t>
-            </a:r>
-            <a:r>
-              <a:rPr lang="en-US" sz="2800" i="1" dirty="0" smtClean="0">
+              <a:t> cues to vowel mispronunciation detection. </a:t>
+            </a:r>
+            <a:r>
+              <a:rPr lang="en-US" sz="2800" i="1" dirty="0">
                 <a:solidFill>
                   <a:srgbClr val="000000"/>
                 </a:solidFill>
               </a:rPr>
               <a:t>J of Child Lang</a:t>
             </a:r>
-            <a:endParaRPr lang="en-US" sz="2800" dirty="0" smtClean="0">
+            <a:endParaRPr lang="en-US" sz="2800" dirty="0">
               <a:solidFill>
                 <a:srgbClr val="000000"/>
               </a:solidFill>
@@ -6704,7 +6534,7 @@
               <a:buAutoNum type="arabicPeriod"/>
             </a:pPr>
             <a:r>
-              <a:rPr lang="en-US" sz="2800" dirty="0" err="1" smtClean="0">
+              <a:rPr lang="en-US" sz="2800" dirty="0" err="1">
                 <a:solidFill>
                   <a:srgbClr val="000000"/>
                 </a:solidFill>
@@ -6712,7 +6542,7 @@
               <a:t>Halberda</a:t>
             </a:r>
             <a:r>
-              <a:rPr lang="en-US" sz="2800" dirty="0" smtClean="0">
+              <a:rPr lang="en-US" sz="2800" dirty="0">
                 <a:solidFill>
                   <a:srgbClr val="000000"/>
                 </a:solidFill>
@@ -6720,7 +6550,7 @@
               <a:t> (2003). The development of a word-learning strategy. </a:t>
             </a:r>
             <a:r>
-              <a:rPr lang="en-US" sz="2800" i="1" dirty="0" smtClean="0">
+              <a:rPr lang="en-US" sz="2800" i="1" dirty="0">
                 <a:solidFill>
                   <a:srgbClr val="000000"/>
                 </a:solidFill>
@@ -6782,7 +6612,7 @@
           <a:p>
             <a:pPr algn="ctr"/>
             <a:r>
-              <a:rPr lang="en-US" sz="4800" u="sng" dirty="0" smtClean="0">
+              <a:rPr lang="en-US" sz="4800" u="sng" dirty="0">
                 <a:solidFill>
                   <a:schemeClr val="tx1"/>
                 </a:solidFill>
@@ -6798,44 +6628,14 @@
               <a:buChar char="-"/>
             </a:pPr>
             <a:r>
-              <a:rPr lang="en-US" sz="4800" b="0" dirty="0" smtClean="0">
+              <a:rPr lang="en-US" sz="4800" b="0" dirty="0">
                 <a:solidFill>
                   <a:schemeClr val="tx1"/>
                 </a:solidFill>
                 <a:latin typeface="Times"/>
                 <a:cs typeface="Times"/>
               </a:rPr>
-              <a:t>32 </a:t>
-            </a:r>
-            <a:r>
-              <a:rPr lang="en-US" sz="4800" b="0" dirty="0">
-                <a:solidFill>
-                  <a:schemeClr val="tx1"/>
-                </a:solidFill>
-                <a:latin typeface="Times"/>
-                <a:cs typeface="Times"/>
-              </a:rPr>
-              <a:t>papers </a:t>
-            </a:r>
-            <a:r>
-              <a:rPr lang="en-US" sz="4800" b="0" dirty="0" smtClean="0">
-                <a:solidFill>
-                  <a:schemeClr val="tx1"/>
-                </a:solidFill>
-                <a:latin typeface="Times"/>
-                <a:cs typeface="Times"/>
-              </a:rPr>
-              <a:t>(27 journal </a:t>
-            </a:r>
-            <a:r>
-              <a:rPr lang="en-US" sz="4800" b="0" dirty="0">
-                <a:solidFill>
-                  <a:schemeClr val="tx1"/>
-                </a:solidFill>
-                <a:latin typeface="Times"/>
-                <a:cs typeface="Times"/>
-              </a:rPr>
-              <a:t>articles)</a:t>
+              <a:t>32 papers (27 journal articles)</a:t>
             </a:r>
           </a:p>
           <a:p>
@@ -6844,24 +6644,14 @@
               <a:buChar char="-"/>
             </a:pPr>
             <a:r>
-              <a:rPr lang="en-US" sz="4800" b="0" dirty="0" smtClean="0">
+              <a:rPr lang="en-US" sz="4800" b="0" dirty="0">
                 <a:solidFill>
                   <a:schemeClr val="tx1"/>
                 </a:solidFill>
                 <a:latin typeface="Times"/>
                 <a:cs typeface="Times"/>
               </a:rPr>
-              <a:t>249 unique </a:t>
-            </a:r>
-            <a:r>
-              <a:rPr lang="en-US" sz="4800" b="0" dirty="0">
-                <a:solidFill>
-                  <a:schemeClr val="tx1"/>
-                </a:solidFill>
-                <a:latin typeface="Times"/>
-                <a:cs typeface="Times"/>
-              </a:rPr>
-              <a:t>experimental conditions</a:t>
+              <a:t>249 unique experimental conditions</a:t>
             </a:r>
           </a:p>
           <a:p>
@@ -6870,24 +6660,14 @@
               <a:buChar char="-"/>
             </a:pPr>
             <a:r>
-              <a:rPr lang="en-US" sz="4800" b="0" dirty="0" smtClean="0">
+              <a:rPr lang="en-US" sz="4800" b="0" dirty="0">
                 <a:solidFill>
                   <a:schemeClr val="tx1"/>
                 </a:solidFill>
                 <a:latin typeface="Times"/>
                 <a:cs typeface="Times"/>
               </a:rPr>
-              <a:t>2252 </a:t>
-            </a:r>
-            <a:r>
-              <a:rPr lang="en-US" sz="4800" b="0" dirty="0">
-                <a:solidFill>
-                  <a:schemeClr val="tx1"/>
-                </a:solidFill>
-                <a:latin typeface="Times"/>
-                <a:cs typeface="Times"/>
-              </a:rPr>
-              <a:t>infants</a:t>
+              <a:t>2252 infants</a:t>
             </a:r>
           </a:p>
           <a:p>
@@ -6903,37 +6683,7 @@
                 <a:latin typeface="Times"/>
                 <a:cs typeface="Times"/>
               </a:rPr>
-              <a:t>6</a:t>
-            </a:r>
-            <a:r>
-              <a:rPr lang="en-US" sz="4800" b="0" dirty="0" smtClean="0">
-                <a:solidFill>
-                  <a:schemeClr val="tx1"/>
-                </a:solidFill>
-                <a:latin typeface="Times"/>
-                <a:cs typeface="Times"/>
-              </a:rPr>
-              <a:t> </a:t>
-            </a:r>
-            <a:r>
-              <a:rPr lang="en-US" sz="4800" b="0" dirty="0">
-                <a:solidFill>
-                  <a:schemeClr val="tx1"/>
-                </a:solidFill>
-                <a:latin typeface="Times"/>
-                <a:cs typeface="Times"/>
-              </a:rPr>
-              <a:t>to </a:t>
-            </a:r>
-            <a:r>
-              <a:rPr lang="en-US" sz="4800" b="0" dirty="0" smtClean="0">
-                <a:solidFill>
-                  <a:schemeClr val="tx1"/>
-                </a:solidFill>
-                <a:latin typeface="Times"/>
-                <a:cs typeface="Times"/>
-              </a:rPr>
-              <a:t>31 months-of-age</a:t>
+              <a:t>6 to 31 months-of-age</a:t>
             </a:r>
           </a:p>
         </p:txBody>
@@ -6979,14 +6729,13 @@
               </a:spcAft>
             </a:pPr>
             <a:r>
-              <a:rPr lang="de-DE" sz="4800" dirty="0" err="1" smtClean="0"/>
+              <a:rPr lang="de-DE" sz="4800" dirty="0" err="1"/>
               <a:t>Contact</a:t>
             </a:r>
             <a:r>
-              <a:rPr lang="de-DE" sz="4800" dirty="0" smtClean="0"/>
+              <a:rPr lang="de-DE" sz="4800" dirty="0"/>
               <a:t>: Katie Von Holzen (katie.m.vonholzen@gmail.com) &amp; Christina Bergmann (chbergma@gmail.com) </a:t>
             </a:r>
-            <a:endParaRPr lang="de-DE" sz="4800" dirty="0"/>
           </a:p>
         </p:txBody>
       </p:sp>
@@ -7085,7 +6834,7 @@
           <a:p>
             <a:pPr algn="ctr"/>
             <a:r>
-              <a:rPr lang="en-US" sz="4800" u="sng" dirty="0" smtClean="0">
+              <a:rPr lang="en-US" sz="4800" u="sng" dirty="0">
                 <a:solidFill>
                   <a:schemeClr val="tx1"/>
                 </a:solidFill>
@@ -7097,7 +6846,7 @@
           </a:p>
           <a:p>
             <a:pPr algn="ctr"/>
-            <a:endParaRPr lang="en-US" sz="4800" u="sng" dirty="0" smtClean="0">
+            <a:endParaRPr lang="en-US" sz="4800" u="sng" dirty="0">
               <a:solidFill>
                 <a:schemeClr val="tx1"/>
               </a:solidFill>
@@ -7117,7 +6866,7 @@
           </a:p>
           <a:p>
             <a:pPr algn="ctr"/>
-            <a:endParaRPr lang="en-US" sz="4800" b="0" i="1" u="sng" dirty="0" smtClean="0">
+            <a:endParaRPr lang="en-US" sz="4800" b="0" i="1" u="sng" dirty="0">
               <a:solidFill>
                 <a:schemeClr val="tx1"/>
               </a:solidFill>
@@ -7137,7 +6886,7 @@
           </a:p>
           <a:p>
             <a:pPr algn="ctr"/>
-            <a:endParaRPr lang="en-US" sz="4800" b="0" i="1" u="sng" dirty="0" smtClean="0">
+            <a:endParaRPr lang="en-US" sz="4800" b="0" i="1" u="sng" dirty="0">
               <a:solidFill>
                 <a:schemeClr val="tx1"/>
               </a:solidFill>
@@ -7157,7 +6906,7 @@
           </a:p>
           <a:p>
             <a:pPr algn="ctr"/>
-            <a:endParaRPr lang="en-US" sz="4800" b="0" i="1" dirty="0" smtClean="0">
+            <a:endParaRPr lang="en-US" sz="4800" b="0" i="1" dirty="0">
               <a:solidFill>
                 <a:schemeClr val="tx1"/>
               </a:solidFill>
@@ -7214,7 +6963,7 @@
           <a:p>
             <a:pPr algn="ctr"/>
             <a:r>
-              <a:rPr lang="en-US" sz="4800" u="sng" dirty="0" smtClean="0">
+              <a:rPr lang="en-US" sz="4800" u="sng" dirty="0">
                 <a:solidFill>
                   <a:schemeClr val="tx1"/>
                 </a:solidFill>
@@ -7236,7 +6985,7 @@
           </a:p>
           <a:p>
             <a:pPr algn="ctr"/>
-            <a:endParaRPr lang="en-US" sz="4800" b="0" i="1" u="sng" dirty="0" smtClean="0">
+            <a:endParaRPr lang="en-US" sz="4800" b="0" i="1" u="sng" dirty="0">
               <a:solidFill>
                 <a:schemeClr val="tx1"/>
               </a:solidFill>
@@ -7256,17 +7005,7 @@
           </a:p>
           <a:p>
             <a:pPr algn="ctr"/>
-            <a:endParaRPr lang="en-US" sz="4800" b="0" i="1" u="sng" dirty="0" smtClean="0">
-              <a:solidFill>
-                <a:schemeClr val="tx1"/>
-              </a:solidFill>
-              <a:latin typeface="Times"/>
-              <a:cs typeface="Times"/>
-            </a:endParaRPr>
-          </a:p>
-          <a:p>
-            <a:pPr algn="ctr"/>
-            <a:endParaRPr lang="en-US" sz="4800" b="0" i="1" u="sng" dirty="0" smtClean="0">
+            <a:endParaRPr lang="en-US" sz="4800" b="0" i="1" u="sng" dirty="0">
               <a:solidFill>
                 <a:schemeClr val="tx1"/>
               </a:solidFill>
@@ -7286,7 +7025,17 @@
           </a:p>
           <a:p>
             <a:pPr algn="ctr"/>
-            <a:endParaRPr lang="en-US" sz="4800" b="0" i="1" u="sng" dirty="0" smtClean="0">
+            <a:endParaRPr lang="en-US" sz="4800" b="0" i="1" u="sng" dirty="0">
+              <a:solidFill>
+                <a:schemeClr val="tx1"/>
+              </a:solidFill>
+              <a:latin typeface="Times"/>
+              <a:cs typeface="Times"/>
+            </a:endParaRPr>
+          </a:p>
+          <a:p>
+            <a:pPr algn="ctr"/>
+            <a:endParaRPr lang="en-US" sz="4800" b="0" i="1" u="sng" dirty="0">
               <a:solidFill>
                 <a:schemeClr val="tx1"/>
               </a:solidFill>
@@ -7343,7 +7092,7 @@
           <a:p>
             <a:pPr algn="ctr"/>
             <a:r>
-              <a:rPr lang="en-US" sz="4800" u="sng" dirty="0" smtClean="0">
+              <a:rPr lang="en-US" sz="4800" u="sng" dirty="0">
                 <a:solidFill>
                   <a:schemeClr val="tx1"/>
                 </a:solidFill>
@@ -7351,124 +7100,6 @@
                 <a:cs typeface="Times"/>
               </a:rPr>
               <a:t>Conclusions</a:t>
-            </a:r>
-            <a:endParaRPr lang="en-US" sz="4800" b="0" dirty="0" smtClean="0">
-              <a:solidFill>
-                <a:schemeClr val="tx1"/>
-              </a:solidFill>
-              <a:latin typeface="Times"/>
-              <a:cs typeface="Times"/>
-            </a:endParaRPr>
-          </a:p>
-          <a:p>
-            <a:pPr marL="685800" indent="-685800">
-              <a:buFont typeface="Wingdings" charset="2"/>
-              <a:buChar char="§"/>
-            </a:pPr>
-            <a:r>
-              <a:rPr lang="en-US" sz="4800" b="0" dirty="0" smtClean="0">
-                <a:solidFill>
-                  <a:schemeClr val="tx1"/>
-                </a:solidFill>
-                <a:latin typeface="Times"/>
-                <a:cs typeface="Times"/>
-              </a:rPr>
-              <a:t>Sensitivity to mispronunciations stays consistent as infants age (Theory 3)</a:t>
-            </a:r>
-          </a:p>
-          <a:p>
-            <a:pPr marL="685800" indent="-685800">
-              <a:buFont typeface="Wingdings" charset="2"/>
-              <a:buChar char="§"/>
-            </a:pPr>
-            <a:r>
-              <a:rPr lang="en-US" sz="4800" b="0" dirty="0">
-                <a:solidFill>
-                  <a:schemeClr val="tx1"/>
-                </a:solidFill>
-                <a:latin typeface="Times"/>
-                <a:cs typeface="Times"/>
-              </a:rPr>
-              <a:t>Sensitivity to mispronunciations increases as the number of features changed </a:t>
-            </a:r>
-            <a:r>
-              <a:rPr lang="en-US" sz="4800" b="0" dirty="0" smtClean="0">
-                <a:solidFill>
-                  <a:schemeClr val="tx1"/>
-                </a:solidFill>
-                <a:latin typeface="Times"/>
-                <a:cs typeface="Times"/>
-              </a:rPr>
-              <a:t>increases; consistent as infants age</a:t>
-            </a:r>
-          </a:p>
-          <a:p>
-            <a:pPr marL="2678823" lvl="1" indent="-685800">
-              <a:buFont typeface="Wingdings" charset="2"/>
-              <a:buChar char="§"/>
-            </a:pPr>
-            <a:r>
-              <a:rPr lang="en-US" sz="4800" b="0" dirty="0" smtClean="0">
-                <a:solidFill>
-                  <a:schemeClr val="tx1"/>
-                </a:solidFill>
-                <a:latin typeface="Times"/>
-                <a:cs typeface="Times"/>
-              </a:rPr>
-              <a:t>Infants are sensitive to size of mispronunciation</a:t>
-            </a:r>
-            <a:r>
-              <a:rPr lang="en-US" sz="4800" b="0" baseline="30000" dirty="0">
-                <a:solidFill>
-                  <a:schemeClr val="tx1"/>
-                </a:solidFill>
-                <a:latin typeface="Times"/>
-                <a:cs typeface="Times"/>
-              </a:rPr>
-              <a:t>3,4</a:t>
-            </a:r>
-            <a:endParaRPr lang="en-US" sz="4800" b="0" dirty="0" smtClean="0">
-              <a:solidFill>
-                <a:schemeClr val="tx1"/>
-              </a:solidFill>
-              <a:latin typeface="Times"/>
-              <a:cs typeface="Times"/>
-            </a:endParaRPr>
-          </a:p>
-          <a:p>
-            <a:pPr marL="685800" indent="-685800">
-              <a:buFont typeface="Wingdings" charset="2"/>
-              <a:buChar char="§"/>
-            </a:pPr>
-            <a:r>
-              <a:rPr lang="en-US" sz="4800" b="0" dirty="0" smtClean="0">
-                <a:solidFill>
-                  <a:schemeClr val="tx1"/>
-                </a:solidFill>
-                <a:latin typeface="Times"/>
-                <a:cs typeface="Times"/>
-              </a:rPr>
-              <a:t>Mispronunciation </a:t>
-            </a:r>
-            <a:r>
-              <a:rPr lang="en-US" sz="4800" b="0" dirty="0">
-                <a:solidFill>
-                  <a:schemeClr val="tx1"/>
-                </a:solidFill>
-                <a:latin typeface="Times"/>
-                <a:cs typeface="Times"/>
-              </a:rPr>
-              <a:t>sensitivity greater </a:t>
-            </a:r>
-            <a:r>
-              <a:rPr lang="en-US" sz="4800" b="0" dirty="0" smtClean="0">
-                <a:solidFill>
-                  <a:schemeClr val="tx1"/>
-                </a:solidFill>
-                <a:latin typeface="Times"/>
-                <a:cs typeface="Times"/>
-              </a:rPr>
-              <a:t>with unfamiliar  distractor; consistent as infants age</a:t>
             </a:r>
             <a:endParaRPr lang="en-US" sz="4800" b="0" dirty="0">
               <a:solidFill>
@@ -7479,12 +7110,93 @@
             </a:endParaRPr>
           </a:p>
           <a:p>
+            <a:pPr marL="685800" indent="-685800">
+              <a:buFont typeface="Wingdings" charset="2"/>
+              <a:buChar char="§"/>
+            </a:pPr>
+            <a:r>
+              <a:rPr lang="en-US" sz="4800" b="0" dirty="0">
+                <a:solidFill>
+                  <a:schemeClr val="tx1"/>
+                </a:solidFill>
+                <a:latin typeface="Times"/>
+                <a:cs typeface="Times"/>
+              </a:rPr>
+              <a:t>Sensitivity to mispronunciations stays consistent as infants age (Theory 3)</a:t>
+            </a:r>
+          </a:p>
+          <a:p>
+            <a:pPr marL="685800" indent="-685800">
+              <a:buFont typeface="Wingdings" charset="2"/>
+              <a:buChar char="§"/>
+            </a:pPr>
+            <a:r>
+              <a:rPr lang="en-US" sz="4800" b="0" dirty="0">
+                <a:solidFill>
+                  <a:schemeClr val="tx1"/>
+                </a:solidFill>
+                <a:latin typeface="Times"/>
+                <a:cs typeface="Times"/>
+              </a:rPr>
+              <a:t>Sensitivity to mispronunciations increases as the number of features changed increases; consistent as infants age</a:t>
+            </a:r>
+          </a:p>
+          <a:p>
             <a:pPr marL="2678823" lvl="1" indent="-685800">
               <a:buFont typeface="Wingdings" charset="2"/>
               <a:buChar char="§"/>
             </a:pPr>
             <a:r>
-              <a:rPr lang="en-US" sz="4800" b="0" dirty="0" smtClean="0">
+              <a:rPr lang="en-US" sz="4800" b="0" dirty="0">
+                <a:solidFill>
+                  <a:schemeClr val="tx1"/>
+                </a:solidFill>
+                <a:latin typeface="Times"/>
+                <a:cs typeface="Times"/>
+              </a:rPr>
+              <a:t>Infants are sensitive to size of mispronunciation</a:t>
+            </a:r>
+            <a:r>
+              <a:rPr lang="en-US" sz="4800" b="0" baseline="30000" dirty="0">
+                <a:solidFill>
+                  <a:schemeClr val="tx1"/>
+                </a:solidFill>
+                <a:latin typeface="Times"/>
+                <a:cs typeface="Times"/>
+              </a:rPr>
+              <a:t>3,4</a:t>
+            </a:r>
+            <a:endParaRPr lang="en-US" sz="4800" b="0" dirty="0">
+              <a:solidFill>
+                <a:schemeClr val="tx1"/>
+              </a:solidFill>
+              <a:latin typeface="Times"/>
+              <a:cs typeface="Times"/>
+            </a:endParaRPr>
+          </a:p>
+          <a:p>
+            <a:pPr marL="685800" indent="-685800">
+              <a:buFont typeface="Wingdings" charset="2"/>
+              <a:buChar char="§"/>
+            </a:pPr>
+            <a:r>
+              <a:rPr lang="en-US" sz="4800" b="0" dirty="0">
+                <a:solidFill>
+                  <a:schemeClr val="tx1"/>
+                </a:solidFill>
+                <a:latin typeface="Times"/>
+                <a:cs typeface="Times"/>
+              </a:rPr>
+              <a:t>Mispronunciation sensitivity greater with unfamiliar  distractor; consistent as infants age</a:t>
+            </a:r>
+          </a:p>
+          <a:p>
+            <a:pPr marL="2678823" lvl="1" indent="-685800">
+              <a:buFont typeface="Wingdings" charset="2"/>
+              <a:buChar char="§"/>
+            </a:pPr>
+            <a:r>
+              <a:rPr lang="en-US" sz="4800" b="0" dirty="0">
                 <a:solidFill>
                   <a:schemeClr val="tx1"/>
                 </a:solidFill>
@@ -7726,25 +7438,8 @@
                 <a:latin typeface="Times"/>
                 <a:cs typeface="Times"/>
               </a:rPr>
-              <a:t>*Focus on ages 18 to 30 months where feature is manipulated</a:t>
-            </a:r>
-            <a:r>
-              <a:rPr lang="en-US" sz="3600" b="0" i="1" dirty="0" smtClean="0">
-                <a:solidFill>
-                  <a:schemeClr val="tx1"/>
-                </a:solidFill>
-                <a:latin typeface="Times"/>
-                <a:cs typeface="Times"/>
-              </a:rPr>
-              <a:t>*</a:t>
-            </a:r>
-            <a:endParaRPr lang="en-US" sz="3600" b="0" i="1" dirty="0">
-              <a:solidFill>
-                <a:schemeClr val="tx1"/>
-              </a:solidFill>
-              <a:latin typeface="Times"/>
-              <a:cs typeface="Times"/>
-            </a:endParaRPr>
+              <a:t>*Focus on ages 18 to 30 months where feature is manipulated*</a:t>
+            </a:r>
           </a:p>
         </p:txBody>
       </p:sp>
@@ -7937,13 +7632,6 @@
   <p:clrMapOvr>
     <a:masterClrMapping/>
   </p:clrMapOvr>
-  <p:timing>
-    <p:tnLst>
-      <p:par>
-        <p:cTn xmlns:p14="http://schemas.microsoft.com/office/powerpoint/2010/main" id="1" dur="indefinite" restart="never" nodeType="tmRoot"/>
-      </p:par>
-    </p:tnLst>
-  </p:timing>
 </p:sld>
 </file>
 

</xml_diff>